<commit_message>
improves class visual effects
</commit_message>
<xml_diff>
--- a/attachments/AnimacaoFlavioCoutinho.pptx
+++ b/attachments/AnimacaoFlavioCoutinho.pptx
@@ -5,7 +5,7 @@
     <p:sldMasterId id="2147483756" r:id="rId1"/>
   </p:sldMasterIdLst>
   <p:notesMasterIdLst>
-    <p:notesMasterId r:id="rId33"/>
+    <p:notesMasterId r:id="rId34"/>
   </p:notesMasterIdLst>
   <p:sldIdLst>
     <p:sldId id="256" r:id="rId2"/>
@@ -32,13 +32,14 @@
     <p:sldId id="273" r:id="rId23"/>
     <p:sldId id="274" r:id="rId24"/>
     <p:sldId id="275" r:id="rId25"/>
-    <p:sldId id="276" r:id="rId26"/>
-    <p:sldId id="277" r:id="rId27"/>
-    <p:sldId id="280" r:id="rId28"/>
-    <p:sldId id="281" r:id="rId29"/>
-    <p:sldId id="283" r:id="rId30"/>
-    <p:sldId id="284" r:id="rId31"/>
-    <p:sldId id="282" r:id="rId32"/>
+    <p:sldId id="288" r:id="rId26"/>
+    <p:sldId id="276" r:id="rId27"/>
+    <p:sldId id="277" r:id="rId28"/>
+    <p:sldId id="280" r:id="rId29"/>
+    <p:sldId id="281" r:id="rId30"/>
+    <p:sldId id="283" r:id="rId31"/>
+    <p:sldId id="284" r:id="rId32"/>
+    <p:sldId id="282" r:id="rId33"/>
   </p:sldIdLst>
   <p:sldSz cx="9144000" cy="6858000" type="screen4x3"/>
   <p:notesSz cx="6858000" cy="9144000"/>
@@ -222,7 +223,7 @@
           <a:p>
             <a:fld id="{00680337-0140-44CC-A93C-28169C4EDDC2}" type="datetimeFigureOut">
               <a:rPr lang="pt-BR" smtClean="0"/>
-              <a:t>02/06/2015</a:t>
+              <a:t>03/11/2015</a:t>
             </a:fld>
             <a:endParaRPr lang="pt-BR"/>
           </a:p>
@@ -757,7 +758,7 @@
       </p:grpSpPr>
       <p:sp>
         <p:nvSpPr>
-          <p:cNvPr id="74754" name="Rectangle 7"/>
+          <p:cNvPr id="73730" name="Rectangle 7"/>
           <p:cNvSpPr>
             <a:spLocks noGrp="1" noChangeArrowheads="1"/>
           </p:cNvSpPr>
@@ -909,7 +910,7 @@
                 <a:spcPct val="0"/>
               </a:spcBef>
             </a:pPr>
-            <a:fld id="{AF85E477-3222-48A5-85DD-C355E5036DFA}" type="slidenum">
+            <a:fld id="{0A27D13E-DE02-431C-971A-95C7289AC552}" type="slidenum">
               <a:rPr lang="en-US" altLang="pt-BR" smtClean="0"/>
               <a:pPr>
                 <a:spcBef>
@@ -924,7 +925,7 @@
       </p:sp>
       <p:sp>
         <p:nvSpPr>
-          <p:cNvPr id="74755" name="Rectangle 2"/>
+          <p:cNvPr id="73731" name="Rectangle 2"/>
           <p:cNvSpPr>
             <a:spLocks noGrp="1" noRot="1" noChangeAspect="1" noChangeArrowheads="1" noTextEdit="1"/>
           </p:cNvSpPr>
@@ -938,7 +939,7 @@
       </p:sp>
       <p:sp>
         <p:nvSpPr>
-          <p:cNvPr id="74756" name="Rectangle 3"/>
+          <p:cNvPr id="73732" name="Rectangle 3"/>
           <p:cNvSpPr>
             <a:spLocks noGrp="1" noChangeArrowheads="1"/>
           </p:cNvSpPr>
@@ -1005,7 +1006,7 @@
       </p:grpSpPr>
       <p:sp>
         <p:nvSpPr>
-          <p:cNvPr id="76802" name="Rectangle 7"/>
+          <p:cNvPr id="74754" name="Rectangle 7"/>
           <p:cNvSpPr>
             <a:spLocks noGrp="1" noChangeArrowheads="1"/>
           </p:cNvSpPr>
@@ -1157,6 +1158,254 @@
                 <a:spcPct val="0"/>
               </a:spcBef>
             </a:pPr>
+            <a:fld id="{AF85E477-3222-48A5-85DD-C355E5036DFA}" type="slidenum">
+              <a:rPr lang="en-US" altLang="pt-BR" smtClean="0"/>
+              <a:pPr>
+                <a:spcBef>
+                  <a:spcPct val="0"/>
+                </a:spcBef>
+              </a:pPr>
+              <a:t>26</a:t>
+            </a:fld>
+            <a:endParaRPr lang="en-US" altLang="pt-BR" smtClean="0"/>
+          </a:p>
+        </p:txBody>
+      </p:sp>
+      <p:sp>
+        <p:nvSpPr>
+          <p:cNvPr id="74755" name="Rectangle 2"/>
+          <p:cNvSpPr>
+            <a:spLocks noGrp="1" noRot="1" noChangeAspect="1" noChangeArrowheads="1" noTextEdit="1"/>
+          </p:cNvSpPr>
+          <p:nvPr>
+            <p:ph type="sldImg"/>
+          </p:nvPr>
+        </p:nvSpPr>
+        <p:spPr>
+          <a:ln/>
+        </p:spPr>
+      </p:sp>
+      <p:sp>
+        <p:nvSpPr>
+          <p:cNvPr id="74756" name="Rectangle 3"/>
+          <p:cNvSpPr>
+            <a:spLocks noGrp="1" noChangeArrowheads="1"/>
+          </p:cNvSpPr>
+          <p:nvPr>
+            <p:ph type="body" idx="1"/>
+          </p:nvPr>
+        </p:nvSpPr>
+        <p:spPr>
+          <a:noFill/>
+          <a:ln/>
+          <a:extLst>
+            <a:ext uri="{909E8E84-426E-40DD-AFC4-6F175D3DCCD1}">
+              <a14:hiddenFill xmlns:a14="http://schemas.microsoft.com/office/drawing/2010/main">
+                <a:solidFill>
+                  <a:srgbClr val="FFFFFF"/>
+                </a:solidFill>
+              </a14:hiddenFill>
+            </a:ext>
+            <a:ext uri="{91240B29-F687-4F45-9708-019B960494DF}">
+              <a14:hiddenLine xmlns:a14="http://schemas.microsoft.com/office/drawing/2010/main" w="9525">
+                <a:solidFill>
+                  <a:srgbClr val="000000"/>
+                </a:solidFill>
+                <a:miter lim="800000"/>
+                <a:headEnd/>
+                <a:tailEnd/>
+              </a14:hiddenLine>
+            </a:ext>
+          </a:extLst>
+        </p:spPr>
+        <p:txBody>
+          <a:bodyPr/>
+          <a:lstStyle/>
+          <a:p>
+            <a:pPr eaLnBrk="1" hangingPunct="1"/>
+            <a:endParaRPr lang="pt-BR" altLang="pt-BR" smtClean="0"/>
+          </a:p>
+        </p:txBody>
+      </p:sp>
+    </p:spTree>
+  </p:cSld>
+  <p:clrMapOvr>
+    <a:masterClrMapping/>
+  </p:clrMapOvr>
+</p:notes>
+</file>
+
+<file path=ppt/notesSlides/notesSlide12.xml><?xml version="1.0" encoding="utf-8"?>
+<p:notes xmlns:a="http://schemas.openxmlformats.org/drawingml/2006/main" xmlns:r="http://schemas.openxmlformats.org/officeDocument/2006/relationships" xmlns:p="http://schemas.openxmlformats.org/presentationml/2006/main">
+  <p:cSld>
+    <p:spTree>
+      <p:nvGrpSpPr>
+        <p:cNvPr id="1" name=""/>
+        <p:cNvGrpSpPr/>
+        <p:nvPr/>
+      </p:nvGrpSpPr>
+      <p:grpSpPr>
+        <a:xfrm>
+          <a:off x="0" y="0"/>
+          <a:ext cx="0" cy="0"/>
+          <a:chOff x="0" y="0"/>
+          <a:chExt cx="0" cy="0"/>
+        </a:xfrm>
+      </p:grpSpPr>
+      <p:sp>
+        <p:nvSpPr>
+          <p:cNvPr id="76802" name="Rectangle 7"/>
+          <p:cNvSpPr>
+            <a:spLocks noGrp="1" noChangeArrowheads="1"/>
+          </p:cNvSpPr>
+          <p:nvPr>
+            <p:ph type="sldNum" sz="quarter" idx="5"/>
+          </p:nvPr>
+        </p:nvSpPr>
+        <p:spPr>
+          <a:noFill/>
+          <a:ln/>
+          <a:extLst>
+            <a:ext uri="{909E8E84-426E-40DD-AFC4-6F175D3DCCD1}">
+              <a14:hiddenFill xmlns:a14="http://schemas.microsoft.com/office/drawing/2010/main">
+                <a:solidFill>
+                  <a:srgbClr val="FFFFFF"/>
+                </a:solidFill>
+              </a14:hiddenFill>
+            </a:ext>
+            <a:ext uri="{91240B29-F687-4F45-9708-019B960494DF}">
+              <a14:hiddenLine xmlns:a14="http://schemas.microsoft.com/office/drawing/2010/main" w="9525">
+                <a:solidFill>
+                  <a:srgbClr val="000000"/>
+                </a:solidFill>
+                <a:miter lim="800000"/>
+                <a:headEnd/>
+                <a:tailEnd/>
+              </a14:hiddenLine>
+            </a:ext>
+          </a:extLst>
+        </p:spPr>
+        <p:txBody>
+          <a:bodyPr/>
+          <a:lstStyle>
+            <a:lvl1pPr eaLnBrk="0" hangingPunct="0">
+              <a:spcBef>
+                <a:spcPct val="30000"/>
+              </a:spcBef>
+              <a:defRPr sz="1200">
+                <a:solidFill>
+                  <a:schemeClr val="tx1"/>
+                </a:solidFill>
+                <a:latin typeface="Times New Roman" pitchFamily="18" charset="0"/>
+              </a:defRPr>
+            </a:lvl1pPr>
+            <a:lvl2pPr marL="742950" indent="-285750" eaLnBrk="0" hangingPunct="0">
+              <a:spcBef>
+                <a:spcPct val="30000"/>
+              </a:spcBef>
+              <a:defRPr sz="1200">
+                <a:solidFill>
+                  <a:schemeClr val="tx1"/>
+                </a:solidFill>
+                <a:latin typeface="Times New Roman" pitchFamily="18" charset="0"/>
+              </a:defRPr>
+            </a:lvl2pPr>
+            <a:lvl3pPr marL="1143000" indent="-228600" eaLnBrk="0" hangingPunct="0">
+              <a:spcBef>
+                <a:spcPct val="30000"/>
+              </a:spcBef>
+              <a:defRPr sz="1200">
+                <a:solidFill>
+                  <a:schemeClr val="tx1"/>
+                </a:solidFill>
+                <a:latin typeface="Times New Roman" pitchFamily="18" charset="0"/>
+              </a:defRPr>
+            </a:lvl3pPr>
+            <a:lvl4pPr marL="1600200" indent="-228600" eaLnBrk="0" hangingPunct="0">
+              <a:spcBef>
+                <a:spcPct val="30000"/>
+              </a:spcBef>
+              <a:defRPr sz="1200">
+                <a:solidFill>
+                  <a:schemeClr val="tx1"/>
+                </a:solidFill>
+                <a:latin typeface="Times New Roman" pitchFamily="18" charset="0"/>
+              </a:defRPr>
+            </a:lvl4pPr>
+            <a:lvl5pPr marL="2057400" indent="-228600" eaLnBrk="0" hangingPunct="0">
+              <a:spcBef>
+                <a:spcPct val="30000"/>
+              </a:spcBef>
+              <a:defRPr sz="1200">
+                <a:solidFill>
+                  <a:schemeClr val="tx1"/>
+                </a:solidFill>
+                <a:latin typeface="Times New Roman" pitchFamily="18" charset="0"/>
+              </a:defRPr>
+            </a:lvl5pPr>
+            <a:lvl6pPr marL="2514600" indent="-228600" eaLnBrk="0" fontAlgn="base" hangingPunct="0">
+              <a:spcBef>
+                <a:spcPct val="30000"/>
+              </a:spcBef>
+              <a:spcAft>
+                <a:spcPct val="0"/>
+              </a:spcAft>
+              <a:defRPr sz="1200">
+                <a:solidFill>
+                  <a:schemeClr val="tx1"/>
+                </a:solidFill>
+                <a:latin typeface="Times New Roman" pitchFamily="18" charset="0"/>
+              </a:defRPr>
+            </a:lvl6pPr>
+            <a:lvl7pPr marL="2971800" indent="-228600" eaLnBrk="0" fontAlgn="base" hangingPunct="0">
+              <a:spcBef>
+                <a:spcPct val="30000"/>
+              </a:spcBef>
+              <a:spcAft>
+                <a:spcPct val="0"/>
+              </a:spcAft>
+              <a:defRPr sz="1200">
+                <a:solidFill>
+                  <a:schemeClr val="tx1"/>
+                </a:solidFill>
+                <a:latin typeface="Times New Roman" pitchFamily="18" charset="0"/>
+              </a:defRPr>
+            </a:lvl7pPr>
+            <a:lvl8pPr marL="3429000" indent="-228600" eaLnBrk="0" fontAlgn="base" hangingPunct="0">
+              <a:spcBef>
+                <a:spcPct val="30000"/>
+              </a:spcBef>
+              <a:spcAft>
+                <a:spcPct val="0"/>
+              </a:spcAft>
+              <a:defRPr sz="1200">
+                <a:solidFill>
+                  <a:schemeClr val="tx1"/>
+                </a:solidFill>
+                <a:latin typeface="Times New Roman" pitchFamily="18" charset="0"/>
+              </a:defRPr>
+            </a:lvl8pPr>
+            <a:lvl9pPr marL="3886200" indent="-228600" eaLnBrk="0" fontAlgn="base" hangingPunct="0">
+              <a:spcBef>
+                <a:spcPct val="30000"/>
+              </a:spcBef>
+              <a:spcAft>
+                <a:spcPct val="0"/>
+              </a:spcAft>
+              <a:defRPr sz="1200">
+                <a:solidFill>
+                  <a:schemeClr val="tx1"/>
+                </a:solidFill>
+                <a:latin typeface="Times New Roman" pitchFamily="18" charset="0"/>
+              </a:defRPr>
+            </a:lvl9pPr>
+          </a:lstStyle>
+          <a:p>
+            <a:pPr>
+              <a:spcBef>
+                <a:spcPct val="0"/>
+              </a:spcBef>
+            </a:pPr>
             <a:fld id="{D5532B8E-4F65-4CEE-8E07-1C80F31859B5}" type="slidenum">
               <a:rPr lang="en-US" altLang="pt-BR" smtClean="0"/>
               <a:pPr>
@@ -1164,7 +1413,7 @@
                   <a:spcPct val="0"/>
                 </a:spcBef>
               </a:pPr>
-              <a:t>26</a:t>
+              <a:t>27</a:t>
             </a:fld>
             <a:endParaRPr lang="en-US" altLang="pt-BR" smtClean="0"/>
           </a:p>
@@ -3412,7 +3661,7 @@
           <a:p>
             <a:fld id="{DA448AAB-2691-46C1-A34D-B11F2CCF3173}" type="datetimeFigureOut">
               <a:rPr lang="pt-BR" smtClean="0"/>
-              <a:t>02/06/2015</a:t>
+              <a:t>03/11/2015</a:t>
             </a:fld>
             <a:endParaRPr lang="pt-BR"/>
           </a:p>
@@ -3577,7 +3826,7 @@
           <a:p>
             <a:fld id="{DA448AAB-2691-46C1-A34D-B11F2CCF3173}" type="datetimeFigureOut">
               <a:rPr lang="pt-BR" smtClean="0"/>
-              <a:t>02/06/2015</a:t>
+              <a:t>03/11/2015</a:t>
             </a:fld>
             <a:endParaRPr lang="pt-BR"/>
           </a:p>
@@ -3752,7 +4001,7 @@
           <a:p>
             <a:fld id="{DA448AAB-2691-46C1-A34D-B11F2CCF3173}" type="datetimeFigureOut">
               <a:rPr lang="pt-BR" smtClean="0"/>
-              <a:t>02/06/2015</a:t>
+              <a:t>03/11/2015</a:t>
             </a:fld>
             <a:endParaRPr lang="pt-BR"/>
           </a:p>
@@ -3917,7 +4166,7 @@
           <a:p>
             <a:fld id="{DA448AAB-2691-46C1-A34D-B11F2CCF3173}" type="datetimeFigureOut">
               <a:rPr lang="pt-BR" smtClean="0"/>
-              <a:t>02/06/2015</a:t>
+              <a:t>03/11/2015</a:t>
             </a:fld>
             <a:endParaRPr lang="pt-BR"/>
           </a:p>
@@ -4158,7 +4407,7 @@
           <a:p>
             <a:fld id="{DA448AAB-2691-46C1-A34D-B11F2CCF3173}" type="datetimeFigureOut">
               <a:rPr lang="pt-BR" smtClean="0"/>
-              <a:t>02/06/2015</a:t>
+              <a:t>03/11/2015</a:t>
             </a:fld>
             <a:endParaRPr lang="pt-BR"/>
           </a:p>
@@ -4441,7 +4690,7 @@
           <a:p>
             <a:fld id="{DA448AAB-2691-46C1-A34D-B11F2CCF3173}" type="datetimeFigureOut">
               <a:rPr lang="pt-BR" smtClean="0"/>
-              <a:t>02/06/2015</a:t>
+              <a:t>03/11/2015</a:t>
             </a:fld>
             <a:endParaRPr lang="pt-BR"/>
           </a:p>
@@ -4870,7 +5119,7 @@
           <a:p>
             <a:fld id="{DA448AAB-2691-46C1-A34D-B11F2CCF3173}" type="datetimeFigureOut">
               <a:rPr lang="pt-BR" smtClean="0"/>
-              <a:t>02/06/2015</a:t>
+              <a:t>03/11/2015</a:t>
             </a:fld>
             <a:endParaRPr lang="pt-BR"/>
           </a:p>
@@ -4983,7 +5232,7 @@
           <a:p>
             <a:fld id="{DA448AAB-2691-46C1-A34D-B11F2CCF3173}" type="datetimeFigureOut">
               <a:rPr lang="pt-BR" smtClean="0"/>
-              <a:t>02/06/2015</a:t>
+              <a:t>03/11/2015</a:t>
             </a:fld>
             <a:endParaRPr lang="pt-BR"/>
           </a:p>
@@ -5073,7 +5322,7 @@
           <a:p>
             <a:fld id="{DA448AAB-2691-46C1-A34D-B11F2CCF3173}" type="datetimeFigureOut">
               <a:rPr lang="pt-BR" smtClean="0"/>
-              <a:t>02/06/2015</a:t>
+              <a:t>03/11/2015</a:t>
             </a:fld>
             <a:endParaRPr lang="pt-BR"/>
           </a:p>
@@ -5262,7 +5511,7 @@
           <a:p>
             <a:fld id="{DA448AAB-2691-46C1-A34D-B11F2CCF3173}" type="datetimeFigureOut">
               <a:rPr lang="pt-BR" smtClean="0"/>
-              <a:t>02/06/2015</a:t>
+              <a:t>03/11/2015</a:t>
             </a:fld>
             <a:endParaRPr lang="pt-BR"/>
           </a:p>
@@ -5580,7 +5829,7 @@
           <a:p>
             <a:fld id="{DA448AAB-2691-46C1-A34D-B11F2CCF3173}" type="datetimeFigureOut">
               <a:rPr lang="pt-BR" smtClean="0"/>
-              <a:t>02/06/2015</a:t>
+              <a:t>03/11/2015</a:t>
             </a:fld>
             <a:endParaRPr lang="pt-BR"/>
           </a:p>
@@ -5959,7 +6208,7 @@
           <a:p>
             <a:fld id="{DA448AAB-2691-46C1-A34D-B11F2CCF3173}" type="datetimeFigureOut">
               <a:rPr lang="pt-BR" smtClean="0"/>
-              <a:t>02/06/2015</a:t>
+              <a:t>03/11/2015</a:t>
             </a:fld>
             <a:endParaRPr lang="pt-BR"/>
           </a:p>
@@ -6299,7 +6548,7 @@
           <a:p>
             <a:r>
               <a:rPr lang="pt-BR" dirty="0" smtClean="0"/>
-              <a:t>Animação em</a:t>
+              <a:t>Animação</a:t>
             </a:r>
             <a:endParaRPr lang="pt-BR" dirty="0"/>
           </a:p>
@@ -6327,7 +6576,11 @@
           <a:p>
             <a:r>
               <a:rPr lang="pt-BR" dirty="0" smtClean="0"/>
-              <a:t>Computação Gráfica</a:t>
+              <a:t>em Computação </a:t>
+            </a:r>
+            <a:r>
+              <a:rPr lang="pt-BR" dirty="0" smtClean="0"/>
+              <a:t>Gráfica</a:t>
             </a:r>
           </a:p>
           <a:p>
@@ -7156,6 +7409,67 @@
           <a:chExt cx="0" cy="0"/>
         </a:xfrm>
       </p:grpSpPr>
+      <p:pic>
+        <p:nvPicPr>
+          <p:cNvPr id="31" name="Picture 5"/>
+          <p:cNvPicPr>
+            <a:picLocks noChangeAspect="1" noChangeArrowheads="1"/>
+          </p:cNvPicPr>
+          <p:nvPr/>
+        </p:nvPicPr>
+        <p:blipFill>
+          <a:blip r:embed="rId2">
+            <a:duotone>
+              <a:schemeClr val="bg2">
+                <a:shade val="45000"/>
+                <a:satMod val="135000"/>
+              </a:schemeClr>
+              <a:prstClr val="white"/>
+            </a:duotone>
+            <a:extLst>
+              <a:ext uri="{28A0092B-C50C-407E-A947-70E740481C1C}">
+                <a14:useLocalDpi xmlns:a14="http://schemas.microsoft.com/office/drawing/2010/main" val="0"/>
+              </a:ext>
+            </a:extLst>
+          </a:blip>
+          <a:srcRect/>
+          <a:stretch>
+            <a:fillRect/>
+          </a:stretch>
+        </p:blipFill>
+        <p:spPr bwMode="auto">
+          <a:xfrm>
+            <a:off x="6263481" y="30783"/>
+            <a:ext cx="2161327" cy="1550186"/>
+          </a:xfrm>
+          <a:prstGeom prst="rect">
+            <a:avLst/>
+          </a:prstGeom>
+          <a:noFill/>
+          <a:ln>
+            <a:noFill/>
+          </a:ln>
+          <a:extLst>
+            <a:ext uri="{909E8E84-426E-40DD-AFC4-6F175D3DCCD1}">
+              <a14:hiddenFill xmlns:a14="http://schemas.microsoft.com/office/drawing/2010/main">
+                <a:solidFill>
+                  <a:srgbClr val="FFFFFF"/>
+                </a:solidFill>
+              </a14:hiddenFill>
+            </a:ext>
+            <a:ext uri="{91240B29-F687-4F45-9708-019B960494DF}">
+              <a14:hiddenLine xmlns:a14="http://schemas.microsoft.com/office/drawing/2010/main" w="9525">
+                <a:solidFill>
+                  <a:srgbClr val="000000"/>
+                </a:solidFill>
+                <a:miter lim="800000"/>
+                <a:headEnd/>
+                <a:tailEnd/>
+              </a14:hiddenLine>
+            </a:ext>
+          </a:extLst>
+        </p:spPr>
+      </p:pic>
       <p:sp>
         <p:nvSpPr>
           <p:cNvPr id="2" name="Título 1"/>
@@ -9814,7 +10128,7 @@
           <p:nvPr/>
         </p:nvPicPr>
         <p:blipFill>
-          <a:blip r:embed="rId2">
+          <a:blip r:embed="rId3">
             <a:extLst>
               <a:ext uri="{28A0092B-C50C-407E-A947-70E740481C1C}">
                 <a14:useLocalDpi xmlns:a14="http://schemas.microsoft.com/office/drawing/2010/main" val="0"/>
@@ -9869,6 +10183,50 @@
           </a:extLst>
         </p:spPr>
       </p:pic>
+      <p:sp>
+        <p:nvSpPr>
+          <p:cNvPr id="4" name="Retângulo 3"/>
+          <p:cNvSpPr/>
+          <p:nvPr/>
+        </p:nvSpPr>
+        <p:spPr>
+          <a:xfrm>
+            <a:off x="7020272" y="1124744"/>
+            <a:ext cx="511324" cy="144016"/>
+          </a:xfrm>
+          <a:prstGeom prst="rect">
+            <a:avLst/>
+          </a:prstGeom>
+          <a:noFill/>
+          <a:ln w="57150">
+            <a:solidFill>
+              <a:srgbClr val="0070C0"/>
+            </a:solidFill>
+          </a:ln>
+        </p:spPr>
+        <p:style>
+          <a:lnRef idx="2">
+            <a:schemeClr val="accent6"/>
+          </a:lnRef>
+          <a:fillRef idx="1">
+            <a:schemeClr val="lt1"/>
+          </a:fillRef>
+          <a:effectRef idx="0">
+            <a:schemeClr val="accent6"/>
+          </a:effectRef>
+          <a:fontRef idx="minor">
+            <a:schemeClr val="dk1"/>
+          </a:fontRef>
+        </p:style>
+        <p:txBody>
+          <a:bodyPr rtlCol="0" anchor="ctr"/>
+          <a:lstStyle/>
+          <a:p>
+            <a:pPr algn="ctr"/>
+            <a:endParaRPr lang="pt-BR"/>
+          </a:p>
+        </p:txBody>
+      </p:sp>
     </p:spTree>
     <p:extLst>
       <p:ext uri="{BB962C8B-B14F-4D97-AF65-F5344CB8AC3E}">
@@ -9966,7 +10324,7 @@
 </file>
 
 <file path=ppt/slides/slide16.xml><?xml version="1.0" encoding="utf-8"?>
-<p:sld xmlns:a="http://schemas.openxmlformats.org/drawingml/2006/main" xmlns:r="http://schemas.openxmlformats.org/officeDocument/2006/relationships" xmlns:p="http://schemas.openxmlformats.org/presentationml/2006/main">
+<p:sld xmlns:a="http://schemas.openxmlformats.org/drawingml/2006/main" xmlns:r="http://schemas.openxmlformats.org/officeDocument/2006/relationships" xmlns:p="http://schemas.openxmlformats.org/presentationml/2006/main" show="0">
   <p:cSld>
     <p:spTree>
       <p:nvGrpSpPr>
@@ -10038,11 +10396,7 @@
           <a:p>
             <a:r>
               <a:rPr lang="pt-BR" dirty="0" smtClean="0"/>
-              <a:t>Exemplo no </a:t>
-            </a:r>
-            <a:r>
-              <a:rPr lang="pt-BR" dirty="0" smtClean="0"/>
-              <a:t>3d </a:t>
+              <a:t>Exemplo no 3d </a:t>
             </a:r>
             <a:r>
               <a:rPr lang="pt-BR" dirty="0" err="1" smtClean="0"/>
@@ -10062,6 +10416,14 @@
   <p:clrMapOvr>
     <a:masterClrMapping/>
   </p:clrMapOvr>
+  <mc:AlternateContent xmlns:mc="http://schemas.openxmlformats.org/markup-compatibility/2006">
+    <mc:Choice xmlns:p14="http://schemas.microsoft.com/office/powerpoint/2010/main" Requires="p14">
+      <p:transition spd="slow" p14:dur="2000"/>
+    </mc:Choice>
+    <mc:Fallback>
+      <p:transition spd="slow"/>
+    </mc:Fallback>
+  </mc:AlternateContent>
   <p:timing>
     <p:tnLst>
       <p:par>
@@ -10089,6 +10451,111 @@
           <a:chExt cx="0" cy="0"/>
         </a:xfrm>
       </p:grpSpPr>
+      <p:pic>
+        <p:nvPicPr>
+          <p:cNvPr id="5" name="Picture 5"/>
+          <p:cNvPicPr>
+            <a:picLocks noChangeAspect="1" noChangeArrowheads="1"/>
+          </p:cNvPicPr>
+          <p:nvPr/>
+        </p:nvPicPr>
+        <p:blipFill>
+          <a:blip r:embed="rId3">
+            <a:duotone>
+              <a:schemeClr val="bg2">
+                <a:shade val="45000"/>
+                <a:satMod val="135000"/>
+              </a:schemeClr>
+              <a:prstClr val="white"/>
+            </a:duotone>
+            <a:extLst>
+              <a:ext uri="{28A0092B-C50C-407E-A947-70E740481C1C}">
+                <a14:useLocalDpi xmlns:a14="http://schemas.microsoft.com/office/drawing/2010/main" val="0"/>
+              </a:ext>
+            </a:extLst>
+          </a:blip>
+          <a:srcRect/>
+          <a:stretch>
+            <a:fillRect/>
+          </a:stretch>
+        </p:blipFill>
+        <p:spPr bwMode="auto">
+          <a:xfrm>
+            <a:off x="6263481" y="30783"/>
+            <a:ext cx="2161327" cy="1550186"/>
+          </a:xfrm>
+          <a:prstGeom prst="rect">
+            <a:avLst/>
+          </a:prstGeom>
+          <a:noFill/>
+          <a:ln>
+            <a:noFill/>
+          </a:ln>
+          <a:extLst>
+            <a:ext uri="{909E8E84-426E-40DD-AFC4-6F175D3DCCD1}">
+              <a14:hiddenFill xmlns:a14="http://schemas.microsoft.com/office/drawing/2010/main">
+                <a:solidFill>
+                  <a:srgbClr val="FFFFFF"/>
+                </a:solidFill>
+              </a14:hiddenFill>
+            </a:ext>
+            <a:ext uri="{91240B29-F687-4F45-9708-019B960494DF}">
+              <a14:hiddenLine xmlns:a14="http://schemas.microsoft.com/office/drawing/2010/main" w="9525">
+                <a:solidFill>
+                  <a:srgbClr val="000000"/>
+                </a:solidFill>
+                <a:miter lim="800000"/>
+                <a:headEnd/>
+                <a:tailEnd/>
+              </a14:hiddenLine>
+            </a:ext>
+          </a:extLst>
+        </p:spPr>
+      </p:pic>
+      <p:sp>
+        <p:nvSpPr>
+          <p:cNvPr id="6" name="Retângulo 5"/>
+          <p:cNvSpPr/>
+          <p:nvPr/>
+        </p:nvSpPr>
+        <p:spPr>
+          <a:xfrm>
+            <a:off x="7020272" y="1124744"/>
+            <a:ext cx="511324" cy="144016"/>
+          </a:xfrm>
+          <a:prstGeom prst="rect">
+            <a:avLst/>
+          </a:prstGeom>
+          <a:noFill/>
+          <a:ln w="57150">
+            <a:solidFill>
+              <a:srgbClr val="0070C0"/>
+            </a:solidFill>
+          </a:ln>
+        </p:spPr>
+        <p:style>
+          <a:lnRef idx="2">
+            <a:schemeClr val="accent6"/>
+          </a:lnRef>
+          <a:fillRef idx="1">
+            <a:schemeClr val="lt1"/>
+          </a:fillRef>
+          <a:effectRef idx="0">
+            <a:schemeClr val="accent6"/>
+          </a:effectRef>
+          <a:fontRef idx="minor">
+            <a:schemeClr val="dk1"/>
+          </a:fontRef>
+        </p:style>
+        <p:txBody>
+          <a:bodyPr rtlCol="0" anchor="ctr"/>
+          <a:lstStyle/>
+          <a:p>
+            <a:pPr algn="ctr"/>
+            <a:endParaRPr lang="pt-BR"/>
+          </a:p>
+        </p:txBody>
+      </p:sp>
       <p:sp>
         <p:nvSpPr>
           <p:cNvPr id="23554" name="Rectangle 2"/>
@@ -10116,10 +10583,18 @@
               <a:t> básicas do </a:t>
             </a:r>
             <a:r>
-              <a:rPr lang="pt-BR" i="1" dirty="0" err="1" smtClean="0"/>
+              <a:rPr lang="pt-BR" i="1" dirty="0" err="1" smtClean="0">
+                <a:solidFill>
+                  <a:srgbClr val="0070C0"/>
+                </a:solidFill>
+              </a:rPr>
               <a:t>keyframing</a:t>
             </a:r>
-            <a:endParaRPr lang="pt-BR" i="1" dirty="0" smtClean="0"/>
+            <a:endParaRPr lang="pt-BR" i="1" dirty="0" smtClean="0">
+              <a:solidFill>
+                <a:srgbClr val="0070C0"/>
+              </a:solidFill>
+            </a:endParaRPr>
           </a:p>
         </p:txBody>
       </p:sp>
@@ -10153,13 +10628,8 @@
             </a:r>
             <a:r>
               <a:rPr lang="pt-BR" sz="2400" dirty="0" smtClean="0"/>
-              <a:t> em </a:t>
-            </a:r>
-            <a:r>
-              <a:rPr lang="pt-BR" sz="2400" dirty="0" smtClean="0"/>
-              <a:t>si</a:t>
-            </a:r>
-            <a:endParaRPr lang="pt-BR" sz="2400" dirty="0" smtClean="0"/>
+              <a:t> em si</a:t>
+            </a:r>
           </a:p>
           <a:p>
             <a:pPr eaLnBrk="1" hangingPunct="1">
@@ -10215,7 +10685,7 @@
           <p:nvPr/>
         </p:nvPicPr>
         <p:blipFill>
-          <a:blip r:embed="rId3">
+          <a:blip r:embed="rId4">
             <a:extLst>
               <a:ext uri="{28A0092B-C50C-407E-A947-70E740481C1C}">
                 <a14:useLocalDpi xmlns:a14="http://schemas.microsoft.com/office/drawing/2010/main" val="0"/>
@@ -10540,6 +11010,111 @@
           </a:extLst>
         </p:spPr>
       </p:pic>
+      <p:pic>
+        <p:nvPicPr>
+          <p:cNvPr id="6" name="Picture 5"/>
+          <p:cNvPicPr>
+            <a:picLocks noChangeAspect="1" noChangeArrowheads="1"/>
+          </p:cNvPicPr>
+          <p:nvPr/>
+        </p:nvPicPr>
+        <p:blipFill>
+          <a:blip r:embed="rId4">
+            <a:duotone>
+              <a:schemeClr val="bg2">
+                <a:shade val="45000"/>
+                <a:satMod val="135000"/>
+              </a:schemeClr>
+              <a:prstClr val="white"/>
+            </a:duotone>
+            <a:extLst>
+              <a:ext uri="{28A0092B-C50C-407E-A947-70E740481C1C}">
+                <a14:useLocalDpi xmlns:a14="http://schemas.microsoft.com/office/drawing/2010/main" val="0"/>
+              </a:ext>
+            </a:extLst>
+          </a:blip>
+          <a:srcRect/>
+          <a:stretch>
+            <a:fillRect/>
+          </a:stretch>
+        </p:blipFill>
+        <p:spPr bwMode="auto">
+          <a:xfrm>
+            <a:off x="6263481" y="30783"/>
+            <a:ext cx="2161327" cy="1550186"/>
+          </a:xfrm>
+          <a:prstGeom prst="rect">
+            <a:avLst/>
+          </a:prstGeom>
+          <a:noFill/>
+          <a:ln>
+            <a:noFill/>
+          </a:ln>
+          <a:extLst>
+            <a:ext uri="{909E8E84-426E-40DD-AFC4-6F175D3DCCD1}">
+              <a14:hiddenFill xmlns:a14="http://schemas.microsoft.com/office/drawing/2010/main">
+                <a:solidFill>
+                  <a:srgbClr val="FFFFFF"/>
+                </a:solidFill>
+              </a14:hiddenFill>
+            </a:ext>
+            <a:ext uri="{91240B29-F687-4F45-9708-019B960494DF}">
+              <a14:hiddenLine xmlns:a14="http://schemas.microsoft.com/office/drawing/2010/main" w="9525">
+                <a:solidFill>
+                  <a:srgbClr val="000000"/>
+                </a:solidFill>
+                <a:miter lim="800000"/>
+                <a:headEnd/>
+                <a:tailEnd/>
+              </a14:hiddenLine>
+            </a:ext>
+          </a:extLst>
+        </p:spPr>
+      </p:pic>
+      <p:sp>
+        <p:nvSpPr>
+          <p:cNvPr id="7" name="Retângulo 6"/>
+          <p:cNvSpPr/>
+          <p:nvPr/>
+        </p:nvSpPr>
+        <p:spPr>
+          <a:xfrm>
+            <a:off x="7020272" y="1124744"/>
+            <a:ext cx="511324" cy="144016"/>
+          </a:xfrm>
+          <a:prstGeom prst="rect">
+            <a:avLst/>
+          </a:prstGeom>
+          <a:noFill/>
+          <a:ln w="57150">
+            <a:solidFill>
+              <a:srgbClr val="0070C0"/>
+            </a:solidFill>
+          </a:ln>
+        </p:spPr>
+        <p:style>
+          <a:lnRef idx="2">
+            <a:schemeClr val="accent6"/>
+          </a:lnRef>
+          <a:fillRef idx="1">
+            <a:schemeClr val="lt1"/>
+          </a:fillRef>
+          <a:effectRef idx="0">
+            <a:schemeClr val="accent6"/>
+          </a:effectRef>
+          <a:fontRef idx="minor">
+            <a:schemeClr val="dk1"/>
+          </a:fontRef>
+        </p:style>
+        <p:txBody>
+          <a:bodyPr rtlCol="0" anchor="ctr"/>
+          <a:lstStyle/>
+          <a:p>
+            <a:pPr algn="ctr"/>
+            <a:endParaRPr lang="pt-BR"/>
+          </a:p>
+        </p:txBody>
+      </p:sp>
     </p:spTree>
     <p:extLst>
       <p:ext uri="{BB962C8B-B14F-4D97-AF65-F5344CB8AC3E}">
@@ -10577,6 +11152,111 @@
           <a:chExt cx="0" cy="0"/>
         </a:xfrm>
       </p:grpSpPr>
+      <p:pic>
+        <p:nvPicPr>
+          <p:cNvPr id="4" name="Picture 5"/>
+          <p:cNvPicPr>
+            <a:picLocks noChangeAspect="1" noChangeArrowheads="1"/>
+          </p:cNvPicPr>
+          <p:nvPr/>
+        </p:nvPicPr>
+        <p:blipFill>
+          <a:blip r:embed="rId3">
+            <a:duotone>
+              <a:schemeClr val="bg2">
+                <a:shade val="45000"/>
+                <a:satMod val="135000"/>
+              </a:schemeClr>
+              <a:prstClr val="white"/>
+            </a:duotone>
+            <a:extLst>
+              <a:ext uri="{28A0092B-C50C-407E-A947-70E740481C1C}">
+                <a14:useLocalDpi xmlns:a14="http://schemas.microsoft.com/office/drawing/2010/main" val="0"/>
+              </a:ext>
+            </a:extLst>
+          </a:blip>
+          <a:srcRect/>
+          <a:stretch>
+            <a:fillRect/>
+          </a:stretch>
+        </p:blipFill>
+        <p:spPr bwMode="auto">
+          <a:xfrm>
+            <a:off x="6263481" y="30783"/>
+            <a:ext cx="2161327" cy="1550186"/>
+          </a:xfrm>
+          <a:prstGeom prst="rect">
+            <a:avLst/>
+          </a:prstGeom>
+          <a:noFill/>
+          <a:ln>
+            <a:noFill/>
+          </a:ln>
+          <a:extLst>
+            <a:ext uri="{909E8E84-426E-40DD-AFC4-6F175D3DCCD1}">
+              <a14:hiddenFill xmlns:a14="http://schemas.microsoft.com/office/drawing/2010/main">
+                <a:solidFill>
+                  <a:srgbClr val="FFFFFF"/>
+                </a:solidFill>
+              </a14:hiddenFill>
+            </a:ext>
+            <a:ext uri="{91240B29-F687-4F45-9708-019B960494DF}">
+              <a14:hiddenLine xmlns:a14="http://schemas.microsoft.com/office/drawing/2010/main" w="9525">
+                <a:solidFill>
+                  <a:srgbClr val="000000"/>
+                </a:solidFill>
+                <a:miter lim="800000"/>
+                <a:headEnd/>
+                <a:tailEnd/>
+              </a14:hiddenLine>
+            </a:ext>
+          </a:extLst>
+        </p:spPr>
+      </p:pic>
+      <p:sp>
+        <p:nvSpPr>
+          <p:cNvPr id="5" name="Retângulo 4"/>
+          <p:cNvSpPr/>
+          <p:nvPr/>
+        </p:nvSpPr>
+        <p:spPr>
+          <a:xfrm>
+            <a:off x="7020272" y="1124744"/>
+            <a:ext cx="511324" cy="144016"/>
+          </a:xfrm>
+          <a:prstGeom prst="rect">
+            <a:avLst/>
+          </a:prstGeom>
+          <a:noFill/>
+          <a:ln w="57150">
+            <a:solidFill>
+              <a:srgbClr val="0070C0"/>
+            </a:solidFill>
+          </a:ln>
+        </p:spPr>
+        <p:style>
+          <a:lnRef idx="2">
+            <a:schemeClr val="accent6"/>
+          </a:lnRef>
+          <a:fillRef idx="1">
+            <a:schemeClr val="lt1"/>
+          </a:fillRef>
+          <a:effectRef idx="0">
+            <a:schemeClr val="accent6"/>
+          </a:effectRef>
+          <a:fontRef idx="minor">
+            <a:schemeClr val="dk1"/>
+          </a:fontRef>
+        </p:style>
+        <p:txBody>
+          <a:bodyPr rtlCol="0" anchor="ctr"/>
+          <a:lstStyle/>
+          <a:p>
+            <a:pPr algn="ctr"/>
+            <a:endParaRPr lang="pt-BR"/>
+          </a:p>
+        </p:txBody>
+      </p:sp>
       <p:sp>
         <p:nvSpPr>
           <p:cNvPr id="25602" name="Rectangle 2"/>
@@ -10767,7 +11447,7 @@
         <p:spPr/>
         <p:txBody>
           <a:bodyPr>
-            <a:normAutofit/>
+            <a:normAutofit fontScale="92500" lnSpcReduction="20000"/>
           </a:bodyPr>
           <a:lstStyle/>
           <a:p>
@@ -10779,15 +11459,89 @@
           <a:p>
             <a:r>
               <a:rPr lang="pt-BR" sz="3200" dirty="0" smtClean="0"/>
-              <a:t>Tipos de criação de Animação</a:t>
-            </a:r>
-          </a:p>
-          <a:p>
+              <a:t>Tipos de criação de </a:t>
+            </a:r>
             <a:r>
               <a:rPr lang="pt-BR" sz="3200" dirty="0" smtClean="0"/>
-              <a:t>Técnicas de Animação</a:t>
-            </a:r>
-            <a:endParaRPr lang="pt-BR" sz="3200" dirty="0"/>
+              <a:t>Animação</a:t>
+            </a:r>
+          </a:p>
+          <a:p>
+            <a:pPr lvl="1"/>
+            <a:r>
+              <a:rPr lang="pt-BR" sz="3000" i="1" dirty="0" err="1" smtClean="0"/>
+              <a:t>Keyframes</a:t>
+            </a:r>
+            <a:endParaRPr lang="pt-BR" sz="3000" i="1" dirty="0" smtClean="0"/>
+          </a:p>
+          <a:p>
+            <a:pPr lvl="1"/>
+            <a:r>
+              <a:rPr lang="pt-BR" sz="3000" dirty="0" smtClean="0"/>
+              <a:t>Procedural</a:t>
+            </a:r>
+          </a:p>
+          <a:p>
+            <a:pPr lvl="1"/>
+            <a:r>
+              <a:rPr lang="pt-BR" sz="3000" dirty="0" smtClean="0"/>
+              <a:t>Dinâmica</a:t>
+            </a:r>
+          </a:p>
+          <a:p>
+            <a:pPr lvl="1"/>
+            <a:r>
+              <a:rPr lang="pt-BR" sz="3000" dirty="0" smtClean="0"/>
+              <a:t>Comportamental</a:t>
+            </a:r>
+          </a:p>
+          <a:p>
+            <a:pPr lvl="1"/>
+            <a:r>
+              <a:rPr lang="pt-BR" sz="3000" dirty="0" smtClean="0"/>
+              <a:t>Performance</a:t>
+            </a:r>
+          </a:p>
+          <a:p>
+            <a:pPr lvl="1"/>
+            <a:r>
+              <a:rPr lang="pt-BR" sz="3000" dirty="0" smtClean="0"/>
+              <a:t>Altíssimo nível</a:t>
+            </a:r>
+            <a:endParaRPr lang="pt-BR" sz="3000" dirty="0" smtClean="0"/>
+          </a:p>
+          <a:p>
+            <a:r>
+              <a:rPr lang="pt-BR" sz="3200" dirty="0" smtClean="0"/>
+              <a:t>Técnicas de </a:t>
+            </a:r>
+            <a:r>
+              <a:rPr lang="pt-BR" sz="3200" dirty="0" smtClean="0"/>
+              <a:t>Animação</a:t>
+            </a:r>
+          </a:p>
+          <a:p>
+            <a:pPr lvl="1"/>
+            <a:r>
+              <a:rPr lang="pt-BR" sz="3000" dirty="0" smtClean="0"/>
+              <a:t>Cinemática “</a:t>
+            </a:r>
+            <a:r>
+              <a:rPr lang="pt-BR" sz="3000" dirty="0" err="1" smtClean="0"/>
+              <a:t>Forward</a:t>
+            </a:r>
+            <a:r>
+              <a:rPr lang="pt-BR" sz="3000" dirty="0" smtClean="0"/>
+              <a:t>” (Direta)</a:t>
+            </a:r>
+          </a:p>
+          <a:p>
+            <a:pPr lvl="1"/>
+            <a:r>
+              <a:rPr lang="pt-BR" sz="3000" dirty="0" smtClean="0"/>
+              <a:t>Cinemática Inversa (IK)</a:t>
+            </a:r>
+            <a:endParaRPr lang="pt-BR" sz="3000" dirty="0"/>
           </a:p>
         </p:txBody>
       </p:sp>
@@ -11133,6 +11887,111 @@
           </a:p>
         </p:txBody>
       </p:sp>
+      <p:pic>
+        <p:nvPicPr>
+          <p:cNvPr id="4" name="Picture 5"/>
+          <p:cNvPicPr>
+            <a:picLocks noChangeAspect="1" noChangeArrowheads="1"/>
+          </p:cNvPicPr>
+          <p:nvPr/>
+        </p:nvPicPr>
+        <p:blipFill>
+          <a:blip r:embed="rId3">
+            <a:duotone>
+              <a:schemeClr val="bg2">
+                <a:shade val="45000"/>
+                <a:satMod val="135000"/>
+              </a:schemeClr>
+              <a:prstClr val="white"/>
+            </a:duotone>
+            <a:extLst>
+              <a:ext uri="{28A0092B-C50C-407E-A947-70E740481C1C}">
+                <a14:useLocalDpi xmlns:a14="http://schemas.microsoft.com/office/drawing/2010/main" val="0"/>
+              </a:ext>
+            </a:extLst>
+          </a:blip>
+          <a:srcRect/>
+          <a:stretch>
+            <a:fillRect/>
+          </a:stretch>
+        </p:blipFill>
+        <p:spPr bwMode="auto">
+          <a:xfrm>
+            <a:off x="6263481" y="30783"/>
+            <a:ext cx="2161327" cy="1550186"/>
+          </a:xfrm>
+          <a:prstGeom prst="rect">
+            <a:avLst/>
+          </a:prstGeom>
+          <a:noFill/>
+          <a:ln>
+            <a:noFill/>
+          </a:ln>
+          <a:extLst>
+            <a:ext uri="{909E8E84-426E-40DD-AFC4-6F175D3DCCD1}">
+              <a14:hiddenFill xmlns:a14="http://schemas.microsoft.com/office/drawing/2010/main">
+                <a:solidFill>
+                  <a:srgbClr val="FFFFFF"/>
+                </a:solidFill>
+              </a14:hiddenFill>
+            </a:ext>
+            <a:ext uri="{91240B29-F687-4F45-9708-019B960494DF}">
+              <a14:hiddenLine xmlns:a14="http://schemas.microsoft.com/office/drawing/2010/main" w="9525">
+                <a:solidFill>
+                  <a:srgbClr val="000000"/>
+                </a:solidFill>
+                <a:miter lim="800000"/>
+                <a:headEnd/>
+                <a:tailEnd/>
+              </a14:hiddenLine>
+            </a:ext>
+          </a:extLst>
+        </p:spPr>
+      </p:pic>
+      <p:sp>
+        <p:nvSpPr>
+          <p:cNvPr id="5" name="Retângulo 4"/>
+          <p:cNvSpPr/>
+          <p:nvPr/>
+        </p:nvSpPr>
+        <p:spPr>
+          <a:xfrm>
+            <a:off x="7020272" y="880254"/>
+            <a:ext cx="511324" cy="144016"/>
+          </a:xfrm>
+          <a:prstGeom prst="rect">
+            <a:avLst/>
+          </a:prstGeom>
+          <a:noFill/>
+          <a:ln w="57150">
+            <a:solidFill>
+              <a:srgbClr val="0070C0"/>
+            </a:solidFill>
+          </a:ln>
+        </p:spPr>
+        <p:style>
+          <a:lnRef idx="2">
+            <a:schemeClr val="accent6"/>
+          </a:lnRef>
+          <a:fillRef idx="1">
+            <a:schemeClr val="lt1"/>
+          </a:fillRef>
+          <a:effectRef idx="0">
+            <a:schemeClr val="accent6"/>
+          </a:effectRef>
+          <a:fontRef idx="minor">
+            <a:schemeClr val="dk1"/>
+          </a:fontRef>
+        </p:style>
+        <p:txBody>
+          <a:bodyPr rtlCol="0" anchor="ctr"/>
+          <a:lstStyle/>
+          <a:p>
+            <a:pPr algn="ctr"/>
+            <a:endParaRPr lang="pt-BR"/>
+          </a:p>
+        </p:txBody>
+      </p:sp>
     </p:spTree>
     <p:extLst>
       <p:ext uri="{BB962C8B-B14F-4D97-AF65-F5344CB8AC3E}">
@@ -11170,6 +12029,111 @@
           <a:chExt cx="0" cy="0"/>
         </a:xfrm>
       </p:grpSpPr>
+      <p:pic>
+        <p:nvPicPr>
+          <p:cNvPr id="4" name="Picture 5"/>
+          <p:cNvPicPr>
+            <a:picLocks noChangeAspect="1" noChangeArrowheads="1"/>
+          </p:cNvPicPr>
+          <p:nvPr/>
+        </p:nvPicPr>
+        <p:blipFill>
+          <a:blip r:embed="rId3">
+            <a:duotone>
+              <a:schemeClr val="bg2">
+                <a:shade val="45000"/>
+                <a:satMod val="135000"/>
+              </a:schemeClr>
+              <a:prstClr val="white"/>
+            </a:duotone>
+            <a:extLst>
+              <a:ext uri="{28A0092B-C50C-407E-A947-70E740481C1C}">
+                <a14:useLocalDpi xmlns:a14="http://schemas.microsoft.com/office/drawing/2010/main" val="0"/>
+              </a:ext>
+            </a:extLst>
+          </a:blip>
+          <a:srcRect/>
+          <a:stretch>
+            <a:fillRect/>
+          </a:stretch>
+        </p:blipFill>
+        <p:spPr bwMode="auto">
+          <a:xfrm>
+            <a:off x="6263481" y="30783"/>
+            <a:ext cx="2161327" cy="1550186"/>
+          </a:xfrm>
+          <a:prstGeom prst="rect">
+            <a:avLst/>
+          </a:prstGeom>
+          <a:noFill/>
+          <a:ln>
+            <a:noFill/>
+          </a:ln>
+          <a:extLst>
+            <a:ext uri="{909E8E84-426E-40DD-AFC4-6F175D3DCCD1}">
+              <a14:hiddenFill xmlns:a14="http://schemas.microsoft.com/office/drawing/2010/main">
+                <a:solidFill>
+                  <a:srgbClr val="FFFFFF"/>
+                </a:solidFill>
+              </a14:hiddenFill>
+            </a:ext>
+            <a:ext uri="{91240B29-F687-4F45-9708-019B960494DF}">
+              <a14:hiddenLine xmlns:a14="http://schemas.microsoft.com/office/drawing/2010/main" w="9525">
+                <a:solidFill>
+                  <a:srgbClr val="000000"/>
+                </a:solidFill>
+                <a:miter lim="800000"/>
+                <a:headEnd/>
+                <a:tailEnd/>
+              </a14:hiddenLine>
+            </a:ext>
+          </a:extLst>
+        </p:spPr>
+      </p:pic>
+      <p:sp>
+        <p:nvSpPr>
+          <p:cNvPr id="5" name="Retângulo 4"/>
+          <p:cNvSpPr/>
+          <p:nvPr/>
+        </p:nvSpPr>
+        <p:spPr>
+          <a:xfrm>
+            <a:off x="6901620" y="620688"/>
+            <a:ext cx="748629" cy="144016"/>
+          </a:xfrm>
+          <a:prstGeom prst="rect">
+            <a:avLst/>
+          </a:prstGeom>
+          <a:noFill/>
+          <a:ln w="57150">
+            <a:solidFill>
+              <a:srgbClr val="0070C0"/>
+            </a:solidFill>
+          </a:ln>
+        </p:spPr>
+        <p:style>
+          <a:lnRef idx="2">
+            <a:schemeClr val="accent6"/>
+          </a:lnRef>
+          <a:fillRef idx="1">
+            <a:schemeClr val="lt1"/>
+          </a:fillRef>
+          <a:effectRef idx="0">
+            <a:schemeClr val="accent6"/>
+          </a:effectRef>
+          <a:fontRef idx="minor">
+            <a:schemeClr val="dk1"/>
+          </a:fontRef>
+        </p:style>
+        <p:txBody>
+          <a:bodyPr rtlCol="0" anchor="ctr"/>
+          <a:lstStyle/>
+          <a:p>
+            <a:pPr algn="ctr"/>
+            <a:endParaRPr lang="pt-BR"/>
+          </a:p>
+        </p:txBody>
+      </p:sp>
       <p:sp>
         <p:nvSpPr>
           <p:cNvPr id="39938" name="Rectangle 2"/>
@@ -11360,6 +12324,111 @@
           <a:chExt cx="0" cy="0"/>
         </a:xfrm>
       </p:grpSpPr>
+      <p:pic>
+        <p:nvPicPr>
+          <p:cNvPr id="4" name="Picture 5"/>
+          <p:cNvPicPr>
+            <a:picLocks noChangeAspect="1" noChangeArrowheads="1"/>
+          </p:cNvPicPr>
+          <p:nvPr/>
+        </p:nvPicPr>
+        <p:blipFill>
+          <a:blip r:embed="rId3">
+            <a:duotone>
+              <a:schemeClr val="bg2">
+                <a:shade val="45000"/>
+                <a:satMod val="135000"/>
+              </a:schemeClr>
+              <a:prstClr val="white"/>
+            </a:duotone>
+            <a:extLst>
+              <a:ext uri="{28A0092B-C50C-407E-A947-70E740481C1C}">
+                <a14:useLocalDpi xmlns:a14="http://schemas.microsoft.com/office/drawing/2010/main" val="0"/>
+              </a:ext>
+            </a:extLst>
+          </a:blip>
+          <a:srcRect/>
+          <a:stretch>
+            <a:fillRect/>
+          </a:stretch>
+        </p:blipFill>
+        <p:spPr bwMode="auto">
+          <a:xfrm>
+            <a:off x="6263481" y="30783"/>
+            <a:ext cx="2161327" cy="1550186"/>
+          </a:xfrm>
+          <a:prstGeom prst="rect">
+            <a:avLst/>
+          </a:prstGeom>
+          <a:noFill/>
+          <a:ln>
+            <a:noFill/>
+          </a:ln>
+          <a:extLst>
+            <a:ext uri="{909E8E84-426E-40DD-AFC4-6F175D3DCCD1}">
+              <a14:hiddenFill xmlns:a14="http://schemas.microsoft.com/office/drawing/2010/main">
+                <a:solidFill>
+                  <a:srgbClr val="FFFFFF"/>
+                </a:solidFill>
+              </a14:hiddenFill>
+            </a:ext>
+            <a:ext uri="{91240B29-F687-4F45-9708-019B960494DF}">
+              <a14:hiddenLine xmlns:a14="http://schemas.microsoft.com/office/drawing/2010/main" w="9525">
+                <a:solidFill>
+                  <a:srgbClr val="000000"/>
+                </a:solidFill>
+                <a:miter lim="800000"/>
+                <a:headEnd/>
+                <a:tailEnd/>
+              </a14:hiddenLine>
+            </a:ext>
+          </a:extLst>
+        </p:spPr>
+      </p:pic>
+      <p:sp>
+        <p:nvSpPr>
+          <p:cNvPr id="5" name="Retângulo 4"/>
+          <p:cNvSpPr/>
+          <p:nvPr/>
+        </p:nvSpPr>
+        <p:spPr>
+          <a:xfrm>
+            <a:off x="6901620" y="620688"/>
+            <a:ext cx="748629" cy="144016"/>
+          </a:xfrm>
+          <a:prstGeom prst="rect">
+            <a:avLst/>
+          </a:prstGeom>
+          <a:noFill/>
+          <a:ln w="57150">
+            <a:solidFill>
+              <a:srgbClr val="0070C0"/>
+            </a:solidFill>
+          </a:ln>
+        </p:spPr>
+        <p:style>
+          <a:lnRef idx="2">
+            <a:schemeClr val="accent6"/>
+          </a:lnRef>
+          <a:fillRef idx="1">
+            <a:schemeClr val="lt1"/>
+          </a:fillRef>
+          <a:effectRef idx="0">
+            <a:schemeClr val="accent6"/>
+          </a:effectRef>
+          <a:fontRef idx="minor">
+            <a:schemeClr val="dk1"/>
+          </a:fontRef>
+        </p:style>
+        <p:txBody>
+          <a:bodyPr rtlCol="0" anchor="ctr"/>
+          <a:lstStyle/>
+          <a:p>
+            <a:pPr algn="ctr"/>
+            <a:endParaRPr lang="pt-BR"/>
+          </a:p>
+        </p:txBody>
+      </p:sp>
       <p:sp>
         <p:nvSpPr>
           <p:cNvPr id="40962" name="Rectangle 2"/>
@@ -11667,6 +12736,111 @@
           <a:chExt cx="0" cy="0"/>
         </a:xfrm>
       </p:grpSpPr>
+      <p:pic>
+        <p:nvPicPr>
+          <p:cNvPr id="4" name="Picture 5"/>
+          <p:cNvPicPr>
+            <a:picLocks noChangeAspect="1" noChangeArrowheads="1"/>
+          </p:cNvPicPr>
+          <p:nvPr/>
+        </p:nvPicPr>
+        <p:blipFill>
+          <a:blip r:embed="rId3">
+            <a:duotone>
+              <a:schemeClr val="bg2">
+                <a:shade val="45000"/>
+                <a:satMod val="135000"/>
+              </a:schemeClr>
+              <a:prstClr val="white"/>
+            </a:duotone>
+            <a:extLst>
+              <a:ext uri="{28A0092B-C50C-407E-A947-70E740481C1C}">
+                <a14:useLocalDpi xmlns:a14="http://schemas.microsoft.com/office/drawing/2010/main" val="0"/>
+              </a:ext>
+            </a:extLst>
+          </a:blip>
+          <a:srcRect/>
+          <a:stretch>
+            <a:fillRect/>
+          </a:stretch>
+        </p:blipFill>
+        <p:spPr bwMode="auto">
+          <a:xfrm>
+            <a:off x="6263481" y="30783"/>
+            <a:ext cx="2161327" cy="1550186"/>
+          </a:xfrm>
+          <a:prstGeom prst="rect">
+            <a:avLst/>
+          </a:prstGeom>
+          <a:noFill/>
+          <a:ln>
+            <a:noFill/>
+          </a:ln>
+          <a:extLst>
+            <a:ext uri="{909E8E84-426E-40DD-AFC4-6F175D3DCCD1}">
+              <a14:hiddenFill xmlns:a14="http://schemas.microsoft.com/office/drawing/2010/main">
+                <a:solidFill>
+                  <a:srgbClr val="FFFFFF"/>
+                </a:solidFill>
+              </a14:hiddenFill>
+            </a:ext>
+            <a:ext uri="{91240B29-F687-4F45-9708-019B960494DF}">
+              <a14:hiddenLine xmlns:a14="http://schemas.microsoft.com/office/drawing/2010/main" w="9525">
+                <a:solidFill>
+                  <a:srgbClr val="000000"/>
+                </a:solidFill>
+                <a:miter lim="800000"/>
+                <a:headEnd/>
+                <a:tailEnd/>
+              </a14:hiddenLine>
+            </a:ext>
+          </a:extLst>
+        </p:spPr>
+      </p:pic>
+      <p:sp>
+        <p:nvSpPr>
+          <p:cNvPr id="5" name="Retângulo 4"/>
+          <p:cNvSpPr/>
+          <p:nvPr/>
+        </p:nvSpPr>
+        <p:spPr>
+          <a:xfrm>
+            <a:off x="6321321" y="361684"/>
+            <a:ext cx="422582" cy="144016"/>
+          </a:xfrm>
+          <a:prstGeom prst="rect">
+            <a:avLst/>
+          </a:prstGeom>
+          <a:noFill/>
+          <a:ln w="57150">
+            <a:solidFill>
+              <a:srgbClr val="0070C0"/>
+            </a:solidFill>
+          </a:ln>
+        </p:spPr>
+        <p:style>
+          <a:lnRef idx="2">
+            <a:schemeClr val="accent6"/>
+          </a:lnRef>
+          <a:fillRef idx="1">
+            <a:schemeClr val="lt1"/>
+          </a:fillRef>
+          <a:effectRef idx="0">
+            <a:schemeClr val="accent6"/>
+          </a:effectRef>
+          <a:fontRef idx="minor">
+            <a:schemeClr val="dk1"/>
+          </a:fontRef>
+        </p:style>
+        <p:txBody>
+          <a:bodyPr rtlCol="0" anchor="ctr"/>
+          <a:lstStyle/>
+          <a:p>
+            <a:pPr algn="ctr"/>
+            <a:endParaRPr lang="pt-BR"/>
+          </a:p>
+        </p:txBody>
+      </p:sp>
       <p:sp>
         <p:nvSpPr>
           <p:cNvPr id="43010" name="Rectangle 2"/>
@@ -11905,9 +13079,114 @@
           <a:chExt cx="0" cy="0"/>
         </a:xfrm>
       </p:grpSpPr>
-      <p:sp>
-        <p:nvSpPr>
-          <p:cNvPr id="44034" name="Rectangle 2"/>
+      <p:pic>
+        <p:nvPicPr>
+          <p:cNvPr id="4" name="Picture 5"/>
+          <p:cNvPicPr>
+            <a:picLocks noChangeAspect="1" noChangeArrowheads="1"/>
+          </p:cNvPicPr>
+          <p:nvPr/>
+        </p:nvPicPr>
+        <p:blipFill>
+          <a:blip r:embed="rId4">
+            <a:duotone>
+              <a:schemeClr val="bg2">
+                <a:shade val="45000"/>
+                <a:satMod val="135000"/>
+              </a:schemeClr>
+              <a:prstClr val="white"/>
+            </a:duotone>
+            <a:extLst>
+              <a:ext uri="{28A0092B-C50C-407E-A947-70E740481C1C}">
+                <a14:useLocalDpi xmlns:a14="http://schemas.microsoft.com/office/drawing/2010/main" val="0"/>
+              </a:ext>
+            </a:extLst>
+          </a:blip>
+          <a:srcRect/>
+          <a:stretch>
+            <a:fillRect/>
+          </a:stretch>
+        </p:blipFill>
+        <p:spPr bwMode="auto">
+          <a:xfrm>
+            <a:off x="6263481" y="30783"/>
+            <a:ext cx="2161327" cy="1550186"/>
+          </a:xfrm>
+          <a:prstGeom prst="rect">
+            <a:avLst/>
+          </a:prstGeom>
+          <a:noFill/>
+          <a:ln>
+            <a:noFill/>
+          </a:ln>
+          <a:extLst>
+            <a:ext uri="{909E8E84-426E-40DD-AFC4-6F175D3DCCD1}">
+              <a14:hiddenFill xmlns:a14="http://schemas.microsoft.com/office/drawing/2010/main">
+                <a:solidFill>
+                  <a:srgbClr val="FFFFFF"/>
+                </a:solidFill>
+              </a14:hiddenFill>
+            </a:ext>
+            <a:ext uri="{91240B29-F687-4F45-9708-019B960494DF}">
+              <a14:hiddenLine xmlns:a14="http://schemas.microsoft.com/office/drawing/2010/main" w="9525">
+                <a:solidFill>
+                  <a:srgbClr val="000000"/>
+                </a:solidFill>
+                <a:miter lim="800000"/>
+                <a:headEnd/>
+                <a:tailEnd/>
+              </a14:hiddenLine>
+            </a:ext>
+          </a:extLst>
+        </p:spPr>
+      </p:pic>
+      <p:sp>
+        <p:nvSpPr>
+          <p:cNvPr id="5" name="Retângulo 4"/>
+          <p:cNvSpPr/>
+          <p:nvPr/>
+        </p:nvSpPr>
+        <p:spPr>
+          <a:xfrm>
+            <a:off x="6321321" y="361684"/>
+            <a:ext cx="422582" cy="144016"/>
+          </a:xfrm>
+          <a:prstGeom prst="rect">
+            <a:avLst/>
+          </a:prstGeom>
+          <a:noFill/>
+          <a:ln w="57150">
+            <a:solidFill>
+              <a:srgbClr val="0070C0"/>
+            </a:solidFill>
+          </a:ln>
+        </p:spPr>
+        <p:style>
+          <a:lnRef idx="2">
+            <a:schemeClr val="accent6"/>
+          </a:lnRef>
+          <a:fillRef idx="1">
+            <a:schemeClr val="lt1"/>
+          </a:fillRef>
+          <a:effectRef idx="0">
+            <a:schemeClr val="accent6"/>
+          </a:effectRef>
+          <a:fontRef idx="minor">
+            <a:schemeClr val="dk1"/>
+          </a:fontRef>
+        </p:style>
+        <p:txBody>
+          <a:bodyPr rtlCol="0" anchor="ctr"/>
+          <a:lstStyle/>
+          <a:p>
+            <a:pPr algn="ctr"/>
+            <a:endParaRPr lang="pt-BR"/>
+          </a:p>
+        </p:txBody>
+      </p:sp>
+      <p:sp>
+        <p:nvSpPr>
+          <p:cNvPr id="43010" name="Rectangle 2"/>
           <p:cNvSpPr>
             <a:spLocks noGrp="1" noRot="1" noChangeArrowheads="1"/>
           </p:cNvSpPr>
@@ -11924,121 +13203,67 @@
               <a:defRPr/>
             </a:pPr>
             <a:r>
-              <a:rPr lang="pt-BR" dirty="0" smtClean="0"/>
-              <a:t>Baseada em </a:t>
-            </a:r>
-            <a:r>
               <a:rPr lang="pt-BR" dirty="0" smtClean="0">
                 <a:solidFill>
                   <a:srgbClr val="0070C0"/>
                 </a:solidFill>
               </a:rPr>
-              <a:t>Performance</a:t>
+              <a:t>Animação Comportamental</a:t>
             </a:r>
           </a:p>
         </p:txBody>
       </p:sp>
-      <p:sp>
-        <p:nvSpPr>
-          <p:cNvPr id="44035" name="Rectangle 3"/>
-          <p:cNvSpPr>
-            <a:spLocks noGrp="1" noChangeArrowheads="1"/>
-          </p:cNvSpPr>
+      <p:pic>
+        <p:nvPicPr>
+          <p:cNvPr id="3" name="GUkjC-69vaw?rel=0"/>
+          <p:cNvPicPr>
+            <a:picLocks noGrp="1" noRot="1" noChangeAspect="1"/>
+          </p:cNvPicPr>
           <p:nvPr>
-            <p:ph type="body" idx="1"/>
+            <p:ph idx="1"/>
+            <a:videoFile r:link="rId1"/>
           </p:nvPr>
-        </p:nvSpPr>
-        <p:spPr/>
+        </p:nvPicPr>
+        <p:blipFill>
+          <a:blip r:embed="rId5"/>
+          <a:stretch>
+            <a:fillRect/>
+          </a:stretch>
+        </p:blipFill>
+        <p:spPr>
+          <a:xfrm>
+            <a:off x="1960612" y="2420888"/>
+            <a:ext cx="4572000" cy="2571750"/>
+          </a:xfrm>
+          <a:prstGeom prst="rect">
+            <a:avLst/>
+          </a:prstGeom>
+        </p:spPr>
+      </p:pic>
+      <p:sp>
+        <p:nvSpPr>
+          <p:cNvPr id="6" name="Retângulo 5"/>
+          <p:cNvSpPr/>
+          <p:nvPr/>
+        </p:nvSpPr>
+        <p:spPr>
+          <a:xfrm>
+            <a:off x="1643849" y="5141025"/>
+            <a:ext cx="5700295" cy="369332"/>
+          </a:xfrm>
+          <a:prstGeom prst="rect">
+            <a:avLst/>
+          </a:prstGeom>
+        </p:spPr>
         <p:txBody>
-          <a:bodyPr/>
+          <a:bodyPr wrap="square">
+            <a:spAutoFit/>
+          </a:bodyPr>
           <a:lstStyle/>
           <a:p>
-            <a:pPr eaLnBrk="1" hangingPunct="1">
-              <a:defRPr/>
-            </a:pPr>
-            <a:r>
-              <a:rPr lang="pt-BR" sz="2400" dirty="0" smtClean="0"/>
-              <a:t>Grava animação de ações da vida real</a:t>
-            </a:r>
-          </a:p>
-          <a:p>
-            <a:pPr lvl="1" eaLnBrk="1" hangingPunct="1">
-              <a:defRPr/>
-            </a:pPr>
-            <a:r>
-              <a:rPr lang="pt-BR" sz="2200" dirty="0" smtClean="0"/>
-              <a:t>Usa vídeos reais e tira movimento de objetos</a:t>
-            </a:r>
-          </a:p>
-          <a:p>
-            <a:pPr lvl="1" eaLnBrk="1" hangingPunct="1">
-              <a:defRPr/>
-            </a:pPr>
-            <a:r>
-              <a:rPr lang="pt-BR" sz="2200" dirty="0" smtClean="0"/>
-              <a:t>Usa dispositivos que pegam posição/orientação</a:t>
-            </a:r>
-          </a:p>
-          <a:p>
-            <a:pPr eaLnBrk="1" hangingPunct="1">
-              <a:defRPr/>
-            </a:pPr>
-            <a:r>
-              <a:rPr lang="pt-BR" sz="2400" i="1" dirty="0" smtClean="0"/>
-              <a:t>Motion capture</a:t>
-            </a:r>
-            <a:endParaRPr lang="pt-BR" sz="2800" i="1" dirty="0" smtClean="0"/>
-          </a:p>
-          <a:p>
-            <a:pPr lvl="1" eaLnBrk="1" hangingPunct="1">
-              <a:defRPr/>
-            </a:pPr>
-            <a:r>
-              <a:rPr lang="pt-BR" sz="2200" dirty="0" smtClean="0"/>
-              <a:t>Acompanha movimento de pontos no espaço, por meio magnético, ótico, </a:t>
-            </a:r>
-            <a:r>
-              <a:rPr lang="pt-BR" sz="2200" dirty="0" err="1" smtClean="0"/>
-              <a:t>etc</a:t>
-            </a:r>
-            <a:r>
-              <a:rPr lang="pt-BR" sz="2200" dirty="0" smtClean="0"/>
-              <a:t> (</a:t>
-            </a:r>
-            <a:r>
-              <a:rPr lang="pt-BR" sz="2200" dirty="0" err="1" smtClean="0"/>
-              <a:t>exo-esqueletos</a:t>
-            </a:r>
-            <a:r>
-              <a:rPr lang="pt-BR" sz="2200" dirty="0" smtClean="0"/>
-              <a:t>, face ou rosto)</a:t>
-            </a:r>
-          </a:p>
-          <a:p>
-            <a:pPr lvl="1" eaLnBrk="1" hangingPunct="1">
-              <a:defRPr/>
-            </a:pPr>
-            <a:r>
-              <a:rPr lang="pt-BR" sz="2200" dirty="0" smtClean="0"/>
-              <a:t>Converte para espaço ângulo-juntas</a:t>
-            </a:r>
-          </a:p>
-          <a:p>
-            <a:pPr lvl="1" eaLnBrk="1" hangingPunct="1">
-              <a:defRPr/>
-            </a:pPr>
-            <a:r>
-              <a:rPr lang="pt-BR" sz="2200" dirty="0" smtClean="0"/>
-              <a:t>Usa ângulos para derivar modelo 3D articulado</a:t>
-            </a:r>
-          </a:p>
-          <a:p>
-            <a:pPr lvl="1" eaLnBrk="1" hangingPunct="1">
-              <a:defRPr/>
-            </a:pPr>
-            <a:r>
-              <a:rPr lang="pt-BR" sz="2200" dirty="0" smtClean="0"/>
-              <a:t>Caminhos do movimento podem ser modificados</a:t>
+            <a:r>
+              <a:rPr lang="pt-BR" dirty="0"/>
+              <a:t>https://www.youtube.com/watch?v=GUkjC-69vaw</a:t>
             </a:r>
           </a:p>
         </p:txBody>
@@ -12046,7 +13271,7 @@
     </p:spTree>
     <p:extLst>
       <p:ext uri="{BB962C8B-B14F-4D97-AF65-F5344CB8AC3E}">
-        <p14:creationId xmlns:p14="http://schemas.microsoft.com/office/powerpoint/2010/main" val="3891102901"/>
+        <p14:creationId xmlns:p14="http://schemas.microsoft.com/office/powerpoint/2010/main" val="3698093727"/>
       </p:ext>
     </p:extLst>
   </p:cSld>
@@ -12080,9 +13305,114 @@
           <a:chExt cx="0" cy="0"/>
         </a:xfrm>
       </p:grpSpPr>
-      <p:sp>
-        <p:nvSpPr>
-          <p:cNvPr id="46082" name="Rectangle 2"/>
+      <p:pic>
+        <p:nvPicPr>
+          <p:cNvPr id="4" name="Picture 5"/>
+          <p:cNvPicPr>
+            <a:picLocks noChangeAspect="1" noChangeArrowheads="1"/>
+          </p:cNvPicPr>
+          <p:nvPr/>
+        </p:nvPicPr>
+        <p:blipFill>
+          <a:blip r:embed="rId3">
+            <a:duotone>
+              <a:schemeClr val="bg2">
+                <a:shade val="45000"/>
+                <a:satMod val="135000"/>
+              </a:schemeClr>
+              <a:prstClr val="white"/>
+            </a:duotone>
+            <a:extLst>
+              <a:ext uri="{28A0092B-C50C-407E-A947-70E740481C1C}">
+                <a14:useLocalDpi xmlns:a14="http://schemas.microsoft.com/office/drawing/2010/main" val="0"/>
+              </a:ext>
+            </a:extLst>
+          </a:blip>
+          <a:srcRect/>
+          <a:stretch>
+            <a:fillRect/>
+          </a:stretch>
+        </p:blipFill>
+        <p:spPr bwMode="auto">
+          <a:xfrm>
+            <a:off x="6263481" y="30783"/>
+            <a:ext cx="2161327" cy="1550186"/>
+          </a:xfrm>
+          <a:prstGeom prst="rect">
+            <a:avLst/>
+          </a:prstGeom>
+          <a:noFill/>
+          <a:ln>
+            <a:noFill/>
+          </a:ln>
+          <a:extLst>
+            <a:ext uri="{909E8E84-426E-40DD-AFC4-6F175D3DCCD1}">
+              <a14:hiddenFill xmlns:a14="http://schemas.microsoft.com/office/drawing/2010/main">
+                <a:solidFill>
+                  <a:srgbClr val="FFFFFF"/>
+                </a:solidFill>
+              </a14:hiddenFill>
+            </a:ext>
+            <a:ext uri="{91240B29-F687-4F45-9708-019B960494DF}">
+              <a14:hiddenLine xmlns:a14="http://schemas.microsoft.com/office/drawing/2010/main" w="9525">
+                <a:solidFill>
+                  <a:srgbClr val="000000"/>
+                </a:solidFill>
+                <a:miter lim="800000"/>
+                <a:headEnd/>
+                <a:tailEnd/>
+              </a14:hiddenLine>
+            </a:ext>
+          </a:extLst>
+        </p:spPr>
+      </p:pic>
+      <p:sp>
+        <p:nvSpPr>
+          <p:cNvPr id="5" name="Retângulo 4"/>
+          <p:cNvSpPr/>
+          <p:nvPr/>
+        </p:nvSpPr>
+        <p:spPr>
+          <a:xfrm>
+            <a:off x="6967751" y="361684"/>
+            <a:ext cx="748629" cy="144016"/>
+          </a:xfrm>
+          <a:prstGeom prst="rect">
+            <a:avLst/>
+          </a:prstGeom>
+          <a:noFill/>
+          <a:ln w="57150">
+            <a:solidFill>
+              <a:srgbClr val="0070C0"/>
+            </a:solidFill>
+          </a:ln>
+        </p:spPr>
+        <p:style>
+          <a:lnRef idx="2">
+            <a:schemeClr val="accent6"/>
+          </a:lnRef>
+          <a:fillRef idx="1">
+            <a:schemeClr val="lt1"/>
+          </a:fillRef>
+          <a:effectRef idx="0">
+            <a:schemeClr val="accent6"/>
+          </a:effectRef>
+          <a:fontRef idx="minor">
+            <a:schemeClr val="dk1"/>
+          </a:fontRef>
+        </p:style>
+        <p:txBody>
+          <a:bodyPr rtlCol="0" anchor="ctr"/>
+          <a:lstStyle/>
+          <a:p>
+            <a:pPr algn="ctr"/>
+            <a:endParaRPr lang="pt-BR"/>
+          </a:p>
+        </p:txBody>
+      </p:sp>
+      <p:sp>
+        <p:nvSpPr>
+          <p:cNvPr id="44034" name="Rectangle 2"/>
           <p:cNvSpPr>
             <a:spLocks noGrp="1" noRot="1" noChangeArrowheads="1"/>
           </p:cNvSpPr>
@@ -12100,7 +13430,7 @@
             </a:pPr>
             <a:r>
               <a:rPr lang="pt-BR" dirty="0" smtClean="0"/>
-              <a:t>Animação em </a:t>
+              <a:t>Baseada em </a:t>
             </a:r>
             <a:r>
               <a:rPr lang="pt-BR" dirty="0" smtClean="0">
@@ -12108,14 +13438,14 @@
                   <a:srgbClr val="0070C0"/>
                 </a:solidFill>
               </a:rPr>
-              <a:t>“alto nível”</a:t>
+              <a:t>Performance</a:t>
             </a:r>
           </a:p>
         </p:txBody>
       </p:sp>
       <p:sp>
         <p:nvSpPr>
-          <p:cNvPr id="46083" name="Rectangle 3"/>
+          <p:cNvPr id="44035" name="Rectangle 3"/>
           <p:cNvSpPr>
             <a:spLocks noGrp="1" noChangeArrowheads="1"/>
           </p:cNvSpPr>
@@ -12123,103 +13453,97 @@
             <p:ph type="body" idx="1"/>
           </p:nvPr>
         </p:nvSpPr>
-        <p:spPr>
-          <a:xfrm>
-            <a:off x="323850" y="1700213"/>
-            <a:ext cx="8424863" cy="4968875"/>
-          </a:xfrm>
-        </p:spPr>
+        <p:spPr/>
         <p:txBody>
           <a:bodyPr/>
           <a:lstStyle/>
           <a:p>
             <a:pPr eaLnBrk="1" hangingPunct="1">
-              <a:lnSpc>
-                <a:spcPct val="90000"/>
-              </a:lnSpc>
               <a:defRPr/>
             </a:pPr>
             <a:r>
-              <a:rPr lang="pt-BR" sz="2400" dirty="0" err="1" smtClean="0"/>
-              <a:t>Idéia</a:t>
-            </a:r>
-            <a:r>
               <a:rPr lang="pt-BR" sz="2400" dirty="0" smtClean="0"/>
-              <a:t> principal: juntar animações complexas de uma biblioteca de movimentos</a:t>
-            </a:r>
-          </a:p>
-          <a:p>
-            <a:pPr eaLnBrk="1" hangingPunct="1">
-              <a:lnSpc>
-                <a:spcPct val="90000"/>
-              </a:lnSpc>
+              <a:t>Grava animação de ações da vida real</a:t>
+            </a:r>
+          </a:p>
+          <a:p>
+            <a:pPr lvl="1" eaLnBrk="1" hangingPunct="1">
               <a:defRPr/>
             </a:pPr>
             <a:r>
-              <a:rPr lang="pt-BR" sz="2400" dirty="0" smtClean="0"/>
-              <a:t>Linguagens de script</a:t>
-            </a:r>
-            <a:endParaRPr lang="pt-BR" dirty="0" smtClean="0"/>
+              <a:rPr lang="pt-BR" sz="2200" dirty="0" smtClean="0"/>
+              <a:t>Usa vídeos reais e tira movimento de objetos</a:t>
+            </a:r>
           </a:p>
           <a:p>
             <a:pPr lvl="1" eaLnBrk="1" hangingPunct="1">
-              <a:lnSpc>
-                <a:spcPct val="90000"/>
-              </a:lnSpc>
               <a:defRPr/>
             </a:pPr>
             <a:r>
-              <a:rPr lang="pt-BR" dirty="0" smtClean="0"/>
-              <a:t>Descreve os eventos</a:t>
-            </a:r>
-          </a:p>
-          <a:p>
-            <a:pPr lvl="1" eaLnBrk="1" hangingPunct="1">
-              <a:lnSpc>
-                <a:spcPct val="90000"/>
-              </a:lnSpc>
+              <a:rPr lang="pt-BR" sz="2200" dirty="0" smtClean="0"/>
+              <a:t>Usa dispositivos que pegam posição/orientação</a:t>
+            </a:r>
+          </a:p>
+          <a:p>
+            <a:pPr eaLnBrk="1" hangingPunct="1">
               <a:defRPr/>
             </a:pPr>
             <a:r>
-              <a:rPr lang="pt-BR" dirty="0" smtClean="0"/>
-              <a:t>Descreve suas sequências</a:t>
-            </a:r>
-          </a:p>
-          <a:p>
-            <a:pPr eaLnBrk="1" hangingPunct="1">
-              <a:lnSpc>
-                <a:spcPct val="90000"/>
-              </a:lnSpc>
+              <a:rPr lang="pt-BR" sz="2400" i="1" dirty="0" smtClean="0"/>
+              <a:t>Motion capture</a:t>
+            </a:r>
+            <a:endParaRPr lang="pt-BR" sz="2800" i="1" dirty="0" smtClean="0"/>
+          </a:p>
+          <a:p>
+            <a:pPr lvl="1" eaLnBrk="1" hangingPunct="1">
               <a:defRPr/>
             </a:pPr>
             <a:r>
-              <a:rPr lang="pt-BR" sz="2400" dirty="0" smtClean="0"/>
-              <a:t>Animação a “nível de tarefa”</a:t>
-            </a:r>
-            <a:endParaRPr lang="pt-BR" dirty="0" smtClean="0"/>
+              <a:rPr lang="pt-BR" sz="2200" dirty="0" smtClean="0"/>
+              <a:t>Acompanha movimento de pontos no espaço, por meio magnético, ótico, </a:t>
+            </a:r>
+            <a:r>
+              <a:rPr lang="pt-BR" sz="2200" dirty="0" err="1" smtClean="0"/>
+              <a:t>etc</a:t>
+            </a:r>
+            <a:r>
+              <a:rPr lang="pt-BR" sz="2200" dirty="0" smtClean="0"/>
+              <a:t> (</a:t>
+            </a:r>
+            <a:r>
+              <a:rPr lang="pt-BR" sz="2200" dirty="0" err="1" smtClean="0"/>
+              <a:t>exo-esqueletos</a:t>
+            </a:r>
+            <a:r>
+              <a:rPr lang="pt-BR" sz="2200" dirty="0" smtClean="0"/>
+              <a:t>, face ou rosto)</a:t>
+            </a:r>
           </a:p>
           <a:p>
             <a:pPr lvl="1" eaLnBrk="1" hangingPunct="1">
-              <a:lnSpc>
-                <a:spcPct val="90000"/>
-              </a:lnSpc>
               <a:defRPr/>
             </a:pPr>
             <a:r>
-              <a:rPr lang="pt-BR" dirty="0" smtClean="0"/>
-              <a:t>Vá à cozinha para um bolo, beba líquido, faça o cachorro andar</a:t>
-            </a:r>
-          </a:p>
-          <a:p>
-            <a:pPr eaLnBrk="1" hangingPunct="1">
-              <a:lnSpc>
-                <a:spcPct val="90000"/>
-              </a:lnSpc>
+              <a:rPr lang="pt-BR" sz="2200" dirty="0" smtClean="0"/>
+              <a:t>Converte para espaço ângulo-juntas</a:t>
+            </a:r>
+          </a:p>
+          <a:p>
+            <a:pPr lvl="1" eaLnBrk="1" hangingPunct="1">
               <a:defRPr/>
             </a:pPr>
             <a:r>
-              <a:rPr lang="pt-BR" sz="2400" dirty="0" smtClean="0"/>
-              <a:t>Juntar IA com animação comportamental</a:t>
+              <a:rPr lang="pt-BR" sz="2200" dirty="0" smtClean="0"/>
+              <a:t>Usa ângulos para derivar modelo 3D articulado</a:t>
+            </a:r>
+          </a:p>
+          <a:p>
+            <a:pPr lvl="1" eaLnBrk="1" hangingPunct="1">
+              <a:defRPr/>
+            </a:pPr>
+            <a:r>
+              <a:rPr lang="pt-BR" sz="2200" dirty="0" smtClean="0"/>
+              <a:t>Caminhos do movimento podem ser modificados</a:t>
             </a:r>
           </a:p>
         </p:txBody>
@@ -12227,7 +13551,7 @@
     </p:spTree>
     <p:extLst>
       <p:ext uri="{BB962C8B-B14F-4D97-AF65-F5344CB8AC3E}">
-        <p14:creationId xmlns:p14="http://schemas.microsoft.com/office/powerpoint/2010/main" val="3413531441"/>
+        <p14:creationId xmlns:p14="http://schemas.microsoft.com/office/powerpoint/2010/main" val="3891102901"/>
       </p:ext>
     </p:extLst>
   </p:cSld>
@@ -12261,11 +13585,116 @@
           <a:chExt cx="0" cy="0"/>
         </a:xfrm>
       </p:grpSpPr>
-      <p:sp>
-        <p:nvSpPr>
-          <p:cNvPr id="4" name="Título 3"/>
+      <p:pic>
+        <p:nvPicPr>
+          <p:cNvPr id="4" name="Picture 5"/>
+          <p:cNvPicPr>
+            <a:picLocks noChangeAspect="1" noChangeArrowheads="1"/>
+          </p:cNvPicPr>
+          <p:nvPr/>
+        </p:nvPicPr>
+        <p:blipFill>
+          <a:blip r:embed="rId3">
+            <a:duotone>
+              <a:schemeClr val="bg2">
+                <a:shade val="45000"/>
+                <a:satMod val="135000"/>
+              </a:schemeClr>
+              <a:prstClr val="white"/>
+            </a:duotone>
+            <a:extLst>
+              <a:ext uri="{28A0092B-C50C-407E-A947-70E740481C1C}">
+                <a14:useLocalDpi xmlns:a14="http://schemas.microsoft.com/office/drawing/2010/main" val="0"/>
+              </a:ext>
+            </a:extLst>
+          </a:blip>
+          <a:srcRect/>
+          <a:stretch>
+            <a:fillRect/>
+          </a:stretch>
+        </p:blipFill>
+        <p:spPr bwMode="auto">
+          <a:xfrm>
+            <a:off x="6263481" y="30783"/>
+            <a:ext cx="2161327" cy="1550186"/>
+          </a:xfrm>
+          <a:prstGeom prst="rect">
+            <a:avLst/>
+          </a:prstGeom>
+          <a:noFill/>
+          <a:ln>
+            <a:noFill/>
+          </a:ln>
+          <a:extLst>
+            <a:ext uri="{909E8E84-426E-40DD-AFC4-6F175D3DCCD1}">
+              <a14:hiddenFill xmlns:a14="http://schemas.microsoft.com/office/drawing/2010/main">
+                <a:solidFill>
+                  <a:srgbClr val="FFFFFF"/>
+                </a:solidFill>
+              </a14:hiddenFill>
+            </a:ext>
+            <a:ext uri="{91240B29-F687-4F45-9708-019B960494DF}">
+              <a14:hiddenLine xmlns:a14="http://schemas.microsoft.com/office/drawing/2010/main" w="9525">
+                <a:solidFill>
+                  <a:srgbClr val="000000"/>
+                </a:solidFill>
+                <a:miter lim="800000"/>
+                <a:headEnd/>
+                <a:tailEnd/>
+              </a14:hiddenLine>
+            </a:ext>
+          </a:extLst>
+        </p:spPr>
+      </p:pic>
+      <p:sp>
+        <p:nvSpPr>
+          <p:cNvPr id="5" name="Retângulo 4"/>
+          <p:cNvSpPr/>
+          <p:nvPr/>
+        </p:nvSpPr>
+        <p:spPr>
+          <a:xfrm>
+            <a:off x="6843853" y="59138"/>
+            <a:ext cx="996425" cy="144016"/>
+          </a:xfrm>
+          <a:prstGeom prst="rect">
+            <a:avLst/>
+          </a:prstGeom>
+          <a:noFill/>
+          <a:ln w="57150">
+            <a:solidFill>
+              <a:srgbClr val="0070C0"/>
+            </a:solidFill>
+          </a:ln>
+        </p:spPr>
+        <p:style>
+          <a:lnRef idx="2">
+            <a:schemeClr val="accent6"/>
+          </a:lnRef>
+          <a:fillRef idx="1">
+            <a:schemeClr val="lt1"/>
+          </a:fillRef>
+          <a:effectRef idx="0">
+            <a:schemeClr val="accent6"/>
+          </a:effectRef>
+          <a:fontRef idx="minor">
+            <a:schemeClr val="dk1"/>
+          </a:fontRef>
+        </p:style>
+        <p:txBody>
+          <a:bodyPr rtlCol="0" anchor="ctr"/>
+          <a:lstStyle/>
+          <a:p>
+            <a:pPr algn="ctr"/>
+            <a:endParaRPr lang="pt-BR"/>
+          </a:p>
+        </p:txBody>
+      </p:sp>
+      <p:sp>
+        <p:nvSpPr>
+          <p:cNvPr id="46082" name="Rectangle 2"/>
           <p:cNvSpPr>
-            <a:spLocks noGrp="1"/>
+            <a:spLocks noGrp="1" noRot="1" noChangeArrowheads="1"/>
           </p:cNvSpPr>
           <p:nvPr>
             <p:ph type="title"/>
@@ -12276,43 +13705,160 @@
           <a:bodyPr/>
           <a:lstStyle/>
           <a:p>
+            <a:pPr eaLnBrk="1" hangingPunct="1">
+              <a:defRPr/>
+            </a:pPr>
             <a:r>
               <a:rPr lang="pt-BR" dirty="0" smtClean="0"/>
-              <a:t>Técnicas de Animação</a:t>
-            </a:r>
-            <a:endParaRPr lang="pt-BR" dirty="0"/>
+              <a:t>Animação em </a:t>
+            </a:r>
+            <a:r>
+              <a:rPr lang="pt-BR" dirty="0" smtClean="0">
+                <a:solidFill>
+                  <a:srgbClr val="0070C0"/>
+                </a:solidFill>
+              </a:rPr>
+              <a:t>“Alto Nível</a:t>
+            </a:r>
+            <a:r>
+              <a:rPr lang="pt-BR" dirty="0" smtClean="0">
+                <a:solidFill>
+                  <a:srgbClr val="0070C0"/>
+                </a:solidFill>
+              </a:rPr>
+              <a:t>”</a:t>
+            </a:r>
           </a:p>
         </p:txBody>
       </p:sp>
       <p:sp>
         <p:nvSpPr>
-          <p:cNvPr id="5" name="Espaço Reservado para Texto 4"/>
+          <p:cNvPr id="46083" name="Rectangle 3"/>
           <p:cNvSpPr>
-            <a:spLocks noGrp="1"/>
+            <a:spLocks noGrp="1" noChangeArrowheads="1"/>
           </p:cNvSpPr>
           <p:nvPr>
             <p:ph type="body" idx="1"/>
           </p:nvPr>
         </p:nvSpPr>
-        <p:spPr/>
+        <p:spPr>
+          <a:xfrm>
+            <a:off x="323850" y="1700213"/>
+            <a:ext cx="8424863" cy="4968875"/>
+          </a:xfrm>
+        </p:spPr>
         <p:txBody>
           <a:bodyPr/>
           <a:lstStyle/>
           <a:p>
-            <a:endParaRPr lang="pt-BR" dirty="0"/>
+            <a:pPr eaLnBrk="1" hangingPunct="1">
+              <a:lnSpc>
+                <a:spcPct val="90000"/>
+              </a:lnSpc>
+              <a:defRPr/>
+            </a:pPr>
+            <a:r>
+              <a:rPr lang="pt-BR" sz="2400" dirty="0" err="1" smtClean="0"/>
+              <a:t>Idéia</a:t>
+            </a:r>
+            <a:r>
+              <a:rPr lang="pt-BR" sz="2400" dirty="0" smtClean="0"/>
+              <a:t> principal: juntar animações complexas de uma biblioteca de movimentos</a:t>
+            </a:r>
+          </a:p>
+          <a:p>
+            <a:pPr eaLnBrk="1" hangingPunct="1">
+              <a:lnSpc>
+                <a:spcPct val="90000"/>
+              </a:lnSpc>
+              <a:defRPr/>
+            </a:pPr>
+            <a:r>
+              <a:rPr lang="pt-BR" sz="2400" dirty="0" smtClean="0"/>
+              <a:t>Linguagens de script</a:t>
+            </a:r>
+            <a:endParaRPr lang="pt-BR" dirty="0" smtClean="0"/>
+          </a:p>
+          <a:p>
+            <a:pPr lvl="1" eaLnBrk="1" hangingPunct="1">
+              <a:lnSpc>
+                <a:spcPct val="90000"/>
+              </a:lnSpc>
+              <a:defRPr/>
+            </a:pPr>
+            <a:r>
+              <a:rPr lang="pt-BR" dirty="0" smtClean="0"/>
+              <a:t>Descreve os eventos</a:t>
+            </a:r>
+          </a:p>
+          <a:p>
+            <a:pPr lvl="1" eaLnBrk="1" hangingPunct="1">
+              <a:lnSpc>
+                <a:spcPct val="90000"/>
+              </a:lnSpc>
+              <a:defRPr/>
+            </a:pPr>
+            <a:r>
+              <a:rPr lang="pt-BR" dirty="0" smtClean="0"/>
+              <a:t>Descreve suas sequências</a:t>
+            </a:r>
+          </a:p>
+          <a:p>
+            <a:pPr eaLnBrk="1" hangingPunct="1">
+              <a:lnSpc>
+                <a:spcPct val="90000"/>
+              </a:lnSpc>
+              <a:defRPr/>
+            </a:pPr>
+            <a:r>
+              <a:rPr lang="pt-BR" sz="2400" dirty="0" smtClean="0"/>
+              <a:t>Animação a “nível de tarefa”</a:t>
+            </a:r>
+            <a:endParaRPr lang="pt-BR" dirty="0" smtClean="0"/>
+          </a:p>
+          <a:p>
+            <a:pPr lvl="1" eaLnBrk="1" hangingPunct="1">
+              <a:lnSpc>
+                <a:spcPct val="90000"/>
+              </a:lnSpc>
+              <a:defRPr/>
+            </a:pPr>
+            <a:r>
+              <a:rPr lang="pt-BR" dirty="0" smtClean="0"/>
+              <a:t>Vá à cozinha para um bolo, beba líquido, faça o cachorro andar</a:t>
+            </a:r>
+          </a:p>
+          <a:p>
+            <a:pPr eaLnBrk="1" hangingPunct="1">
+              <a:lnSpc>
+                <a:spcPct val="90000"/>
+              </a:lnSpc>
+              <a:defRPr/>
+            </a:pPr>
+            <a:r>
+              <a:rPr lang="pt-BR" sz="2400" dirty="0" smtClean="0"/>
+              <a:t>Juntar IA com animação comportamental</a:t>
+            </a:r>
           </a:p>
         </p:txBody>
       </p:sp>
     </p:spTree>
     <p:extLst>
       <p:ext uri="{BB962C8B-B14F-4D97-AF65-F5344CB8AC3E}">
-        <p14:creationId xmlns:p14="http://schemas.microsoft.com/office/powerpoint/2010/main" val="1199425444"/>
+        <p14:creationId xmlns:p14="http://schemas.microsoft.com/office/powerpoint/2010/main" val="3413531441"/>
       </p:ext>
     </p:extLst>
   </p:cSld>
   <p:clrMapOvr>
     <a:masterClrMapping/>
   </p:clrMapOvr>
+  <p:timing>
+    <p:tnLst>
+      <p:par>
+        <p:cTn id="1" dur="indefinite" restart="never" nodeType="tmRoot"/>
+      </p:par>
+    </p:tnLst>
+  </p:timing>
 </p:sld>
 </file>
 
@@ -12350,6 +13896,78 @@
           <a:p>
             <a:r>
               <a:rPr lang="pt-BR" dirty="0" smtClean="0"/>
+              <a:t>Técnicas de Animação</a:t>
+            </a:r>
+            <a:endParaRPr lang="pt-BR" dirty="0"/>
+          </a:p>
+        </p:txBody>
+      </p:sp>
+      <p:sp>
+        <p:nvSpPr>
+          <p:cNvPr id="5" name="Espaço Reservado para Texto 4"/>
+          <p:cNvSpPr>
+            <a:spLocks noGrp="1"/>
+          </p:cNvSpPr>
+          <p:nvPr>
+            <p:ph type="body" idx="1"/>
+          </p:nvPr>
+        </p:nvSpPr>
+        <p:spPr/>
+        <p:txBody>
+          <a:bodyPr/>
+          <a:lstStyle/>
+          <a:p>
+            <a:endParaRPr lang="pt-BR" dirty="0"/>
+          </a:p>
+        </p:txBody>
+      </p:sp>
+    </p:spTree>
+    <p:extLst>
+      <p:ext uri="{BB962C8B-B14F-4D97-AF65-F5344CB8AC3E}">
+        <p14:creationId xmlns:p14="http://schemas.microsoft.com/office/powerpoint/2010/main" val="1199425444"/>
+      </p:ext>
+    </p:extLst>
+  </p:cSld>
+  <p:clrMapOvr>
+    <a:masterClrMapping/>
+  </p:clrMapOvr>
+</p:sld>
+</file>
+
+<file path=ppt/slides/slide29.xml><?xml version="1.0" encoding="utf-8"?>
+<p:sld xmlns:a="http://schemas.openxmlformats.org/drawingml/2006/main" xmlns:r="http://schemas.openxmlformats.org/officeDocument/2006/relationships" xmlns:p="http://schemas.openxmlformats.org/presentationml/2006/main">
+  <p:cSld>
+    <p:spTree>
+      <p:nvGrpSpPr>
+        <p:cNvPr id="1" name=""/>
+        <p:cNvGrpSpPr/>
+        <p:nvPr/>
+      </p:nvGrpSpPr>
+      <p:grpSpPr>
+        <a:xfrm>
+          <a:off x="0" y="0"/>
+          <a:ext cx="0" cy="0"/>
+          <a:chOff x="0" y="0"/>
+          <a:chExt cx="0" cy="0"/>
+        </a:xfrm>
+      </p:grpSpPr>
+      <p:sp>
+        <p:nvSpPr>
+          <p:cNvPr id="4" name="Título 3"/>
+          <p:cNvSpPr>
+            <a:spLocks noGrp="1"/>
+          </p:cNvSpPr>
+          <p:nvPr>
+            <p:ph type="title"/>
+          </p:nvPr>
+        </p:nvSpPr>
+        <p:spPr/>
+        <p:txBody>
+          <a:bodyPr/>
+          <a:lstStyle/>
+          <a:p>
+            <a:r>
+              <a:rPr lang="pt-BR" dirty="0" smtClean="0"/>
               <a:t>Hierarquias e Articulações</a:t>
             </a:r>
             <a:endParaRPr lang="pt-BR" dirty="0"/>
@@ -12458,7 +14076,79 @@
 </p:sld>
 </file>
 
-<file path=ppt/slides/slide29.xml><?xml version="1.0" encoding="utf-8"?>
+<file path=ppt/slides/slide3.xml><?xml version="1.0" encoding="utf-8"?>
+<p:sld xmlns:a="http://schemas.openxmlformats.org/drawingml/2006/main" xmlns:r="http://schemas.openxmlformats.org/officeDocument/2006/relationships" xmlns:p="http://schemas.openxmlformats.org/presentationml/2006/main">
+  <p:cSld>
+    <p:spTree>
+      <p:nvGrpSpPr>
+        <p:cNvPr id="1" name=""/>
+        <p:cNvGrpSpPr/>
+        <p:nvPr/>
+      </p:nvGrpSpPr>
+      <p:grpSpPr>
+        <a:xfrm>
+          <a:off x="0" y="0"/>
+          <a:ext cx="0" cy="0"/>
+          <a:chOff x="0" y="0"/>
+          <a:chExt cx="0" cy="0"/>
+        </a:xfrm>
+      </p:grpSpPr>
+      <p:sp>
+        <p:nvSpPr>
+          <p:cNvPr id="4" name="Título 3"/>
+          <p:cNvSpPr>
+            <a:spLocks noGrp="1"/>
+          </p:cNvSpPr>
+          <p:nvPr>
+            <p:ph type="title"/>
+          </p:nvPr>
+        </p:nvSpPr>
+        <p:spPr/>
+        <p:txBody>
+          <a:bodyPr/>
+          <a:lstStyle/>
+          <a:p>
+            <a:r>
+              <a:rPr lang="pt-BR" dirty="0" smtClean="0"/>
+              <a:t>Princípios da Animação</a:t>
+            </a:r>
+            <a:endParaRPr lang="pt-BR" dirty="0"/>
+          </a:p>
+        </p:txBody>
+      </p:sp>
+      <p:sp>
+        <p:nvSpPr>
+          <p:cNvPr id="5" name="Espaço Reservado para Texto 4"/>
+          <p:cNvSpPr>
+            <a:spLocks noGrp="1"/>
+          </p:cNvSpPr>
+          <p:nvPr>
+            <p:ph type="body" idx="1"/>
+          </p:nvPr>
+        </p:nvSpPr>
+        <p:spPr/>
+        <p:txBody>
+          <a:bodyPr/>
+          <a:lstStyle/>
+          <a:p>
+            <a:endParaRPr lang="pt-BR"/>
+          </a:p>
+        </p:txBody>
+      </p:sp>
+    </p:spTree>
+    <p:extLst>
+      <p:ext uri="{BB962C8B-B14F-4D97-AF65-F5344CB8AC3E}">
+        <p14:creationId xmlns:p14="http://schemas.microsoft.com/office/powerpoint/2010/main" val="2992118986"/>
+      </p:ext>
+    </p:extLst>
+  </p:cSld>
+  <p:clrMapOvr>
+    <a:masterClrMapping/>
+  </p:clrMapOvr>
+</p:sld>
+</file>
+
+<file path=ppt/slides/slide30.xml><?xml version="1.0" encoding="utf-8"?>
 <p:sld xmlns:a="http://schemas.openxmlformats.org/drawingml/2006/main" xmlns:r="http://schemas.openxmlformats.org/officeDocument/2006/relationships" xmlns:p="http://schemas.openxmlformats.org/presentationml/2006/main">
   <p:cSld>
     <p:spTree>
@@ -12624,79 +14314,7 @@
 </p:sld>
 </file>
 
-<file path=ppt/slides/slide3.xml><?xml version="1.0" encoding="utf-8"?>
-<p:sld xmlns:a="http://schemas.openxmlformats.org/drawingml/2006/main" xmlns:r="http://schemas.openxmlformats.org/officeDocument/2006/relationships" xmlns:p="http://schemas.openxmlformats.org/presentationml/2006/main">
-  <p:cSld>
-    <p:spTree>
-      <p:nvGrpSpPr>
-        <p:cNvPr id="1" name=""/>
-        <p:cNvGrpSpPr/>
-        <p:nvPr/>
-      </p:nvGrpSpPr>
-      <p:grpSpPr>
-        <a:xfrm>
-          <a:off x="0" y="0"/>
-          <a:ext cx="0" cy="0"/>
-          <a:chOff x="0" y="0"/>
-          <a:chExt cx="0" cy="0"/>
-        </a:xfrm>
-      </p:grpSpPr>
-      <p:sp>
-        <p:nvSpPr>
-          <p:cNvPr id="4" name="Título 3"/>
-          <p:cNvSpPr>
-            <a:spLocks noGrp="1"/>
-          </p:cNvSpPr>
-          <p:nvPr>
-            <p:ph type="title"/>
-          </p:nvPr>
-        </p:nvSpPr>
-        <p:spPr/>
-        <p:txBody>
-          <a:bodyPr/>
-          <a:lstStyle/>
-          <a:p>
-            <a:r>
-              <a:rPr lang="pt-BR" dirty="0" smtClean="0"/>
-              <a:t>Princípios da Animação</a:t>
-            </a:r>
-            <a:endParaRPr lang="pt-BR" dirty="0"/>
-          </a:p>
-        </p:txBody>
-      </p:sp>
-      <p:sp>
-        <p:nvSpPr>
-          <p:cNvPr id="5" name="Espaço Reservado para Texto 4"/>
-          <p:cNvSpPr>
-            <a:spLocks noGrp="1"/>
-          </p:cNvSpPr>
-          <p:nvPr>
-            <p:ph type="body" idx="1"/>
-          </p:nvPr>
-        </p:nvSpPr>
-        <p:spPr/>
-        <p:txBody>
-          <a:bodyPr/>
-          <a:lstStyle/>
-          <a:p>
-            <a:endParaRPr lang="pt-BR"/>
-          </a:p>
-        </p:txBody>
-      </p:sp>
-    </p:spTree>
-    <p:extLst>
-      <p:ext uri="{BB962C8B-B14F-4D97-AF65-F5344CB8AC3E}">
-        <p14:creationId xmlns:p14="http://schemas.microsoft.com/office/powerpoint/2010/main" val="2992118986"/>
-      </p:ext>
-    </p:extLst>
-  </p:cSld>
-  <p:clrMapOvr>
-    <a:masterClrMapping/>
-  </p:clrMapOvr>
-</p:sld>
-</file>
-
-<file path=ppt/slides/slide30.xml><?xml version="1.0" encoding="utf-8"?>
+<file path=ppt/slides/slide31.xml><?xml version="1.0" encoding="utf-8"?>
 <p:sld xmlns:a="http://schemas.openxmlformats.org/drawingml/2006/main" xmlns:r="http://schemas.openxmlformats.org/officeDocument/2006/relationships" xmlns:p="http://schemas.openxmlformats.org/presentationml/2006/main">
   <p:cSld>
     <p:spTree>
@@ -13097,7 +14715,7 @@
 </p:sld>
 </file>
 
-<file path=ppt/slides/slide31.xml><?xml version="1.0" encoding="utf-8"?>
+<file path=ppt/slides/slide32.xml><?xml version="1.0" encoding="utf-8"?>
 <p:sld xmlns:a="http://schemas.openxmlformats.org/drawingml/2006/main" xmlns:r="http://schemas.openxmlformats.org/officeDocument/2006/relationships" xmlns:p="http://schemas.openxmlformats.org/presentationml/2006/main">
   <p:cSld>
     <p:spTree>

</xml_diff>